<commit_message>
Next step for June 2022
Ppt slides and final next steps
</commit_message>
<xml_diff>
--- a/EDA/EDA.pptx
+++ b/EDA/EDA.pptx
@@ -8,7 +8,11 @@
     <p:sldId id="256" r:id="rId2"/>
     <p:sldId id="258" r:id="rId3"/>
     <p:sldId id="259" r:id="rId4"/>
-    <p:sldId id="257" r:id="rId5"/>
+    <p:sldId id="262" r:id="rId5"/>
+    <p:sldId id="257" r:id="rId6"/>
+    <p:sldId id="260" r:id="rId7"/>
+    <p:sldId id="261" r:id="rId8"/>
+    <p:sldId id="264" r:id="rId9"/>
   </p:sldIdLst>
   <p:sldSz cx="12192000" cy="6858000"/>
   <p:notesSz cx="6858000" cy="9144000"/>
@@ -264,7 +268,7 @@
           <a:p>
             <a:fld id="{350245AF-60BA-4557-86EC-837D6734E03D}" type="datetimeFigureOut">
               <a:rPr lang="en-MY" smtClean="0"/>
-              <a:t>15/6/2022</a:t>
+              <a:t>24/6/2022</a:t>
             </a:fld>
             <a:endParaRPr lang="en-MY"/>
           </a:p>
@@ -464,7 +468,7 @@
           <a:p>
             <a:fld id="{350245AF-60BA-4557-86EC-837D6734E03D}" type="datetimeFigureOut">
               <a:rPr lang="en-MY" smtClean="0"/>
-              <a:t>15/6/2022</a:t>
+              <a:t>24/6/2022</a:t>
             </a:fld>
             <a:endParaRPr lang="en-MY"/>
           </a:p>
@@ -674,7 +678,7 @@
           <a:p>
             <a:fld id="{350245AF-60BA-4557-86EC-837D6734E03D}" type="datetimeFigureOut">
               <a:rPr lang="en-MY" smtClean="0"/>
-              <a:t>15/6/2022</a:t>
+              <a:t>24/6/2022</a:t>
             </a:fld>
             <a:endParaRPr lang="en-MY"/>
           </a:p>
@@ -874,7 +878,7 @@
           <a:p>
             <a:fld id="{350245AF-60BA-4557-86EC-837D6734E03D}" type="datetimeFigureOut">
               <a:rPr lang="en-MY" smtClean="0"/>
-              <a:t>15/6/2022</a:t>
+              <a:t>24/6/2022</a:t>
             </a:fld>
             <a:endParaRPr lang="en-MY"/>
           </a:p>
@@ -1150,7 +1154,7 @@
           <a:p>
             <a:fld id="{350245AF-60BA-4557-86EC-837D6734E03D}" type="datetimeFigureOut">
               <a:rPr lang="en-MY" smtClean="0"/>
-              <a:t>15/6/2022</a:t>
+              <a:t>24/6/2022</a:t>
             </a:fld>
             <a:endParaRPr lang="en-MY"/>
           </a:p>
@@ -1418,7 +1422,7 @@
           <a:p>
             <a:fld id="{350245AF-60BA-4557-86EC-837D6734E03D}" type="datetimeFigureOut">
               <a:rPr lang="en-MY" smtClean="0"/>
-              <a:t>15/6/2022</a:t>
+              <a:t>24/6/2022</a:t>
             </a:fld>
             <a:endParaRPr lang="en-MY"/>
           </a:p>
@@ -1833,7 +1837,7 @@
           <a:p>
             <a:fld id="{350245AF-60BA-4557-86EC-837D6734E03D}" type="datetimeFigureOut">
               <a:rPr lang="en-MY" smtClean="0"/>
-              <a:t>15/6/2022</a:t>
+              <a:t>24/6/2022</a:t>
             </a:fld>
             <a:endParaRPr lang="en-MY"/>
           </a:p>
@@ -1975,7 +1979,7 @@
           <a:p>
             <a:fld id="{350245AF-60BA-4557-86EC-837D6734E03D}" type="datetimeFigureOut">
               <a:rPr lang="en-MY" smtClean="0"/>
-              <a:t>15/6/2022</a:t>
+              <a:t>24/6/2022</a:t>
             </a:fld>
             <a:endParaRPr lang="en-MY"/>
           </a:p>
@@ -2088,7 +2092,7 @@
           <a:p>
             <a:fld id="{350245AF-60BA-4557-86EC-837D6734E03D}" type="datetimeFigureOut">
               <a:rPr lang="en-MY" smtClean="0"/>
-              <a:t>15/6/2022</a:t>
+              <a:t>24/6/2022</a:t>
             </a:fld>
             <a:endParaRPr lang="en-MY"/>
           </a:p>
@@ -2401,7 +2405,7 @@
           <a:p>
             <a:fld id="{350245AF-60BA-4557-86EC-837D6734E03D}" type="datetimeFigureOut">
               <a:rPr lang="en-MY" smtClean="0"/>
-              <a:t>15/6/2022</a:t>
+              <a:t>24/6/2022</a:t>
             </a:fld>
             <a:endParaRPr lang="en-MY"/>
           </a:p>
@@ -2690,7 +2694,7 @@
           <a:p>
             <a:fld id="{350245AF-60BA-4557-86EC-837D6734E03D}" type="datetimeFigureOut">
               <a:rPr lang="en-MY" smtClean="0"/>
-              <a:t>15/6/2022</a:t>
+              <a:t>24/6/2022</a:t>
             </a:fld>
             <a:endParaRPr lang="en-MY"/>
           </a:p>
@@ -2933,7 +2937,7 @@
           <a:p>
             <a:fld id="{350245AF-60BA-4557-86EC-837D6734E03D}" type="datetimeFigureOut">
               <a:rPr lang="en-MY" smtClean="0"/>
-              <a:t>15/6/2022</a:t>
+              <a:t>24/6/2022</a:t>
             </a:fld>
             <a:endParaRPr lang="en-MY"/>
           </a:p>
@@ -3397,10 +3401,26 @@
         </p:nvSpPr>
         <p:spPr/>
         <p:txBody>
-          <a:bodyPr/>
+          <a:bodyPr>
+            <a:normAutofit/>
+          </a:bodyPr>
           <a:lstStyle/>
           <a:p>
-            <a:endParaRPr lang="en-MY" dirty="0"/>
+            <a:pPr algn="l"/>
+            <a:r>
+              <a:rPr lang="en-MY" sz="2000" dirty="0">
+                <a:hlinkClick r:id="rId2"/>
+              </a:rPr>
+              <a:t>https://www.frontiersin.org/articles/10.3389/frwa.2022.870453/full</a:t>
+            </a:r>
+            <a:endParaRPr lang="en-MY" sz="2000" dirty="0"/>
+          </a:p>
+          <a:p>
+            <a:pPr algn="l"/>
+            <a:r>
+              <a:rPr lang="en-MY" sz="2000" dirty="0"/>
+              <a:t>A suite of paired physical and chemical datasets collected from 97 river corridors across the globe. </a:t>
+            </a:r>
           </a:p>
         </p:txBody>
       </p:sp>
@@ -3528,6 +3548,36 @@
           </a:p>
         </p:txBody>
       </p:sp>
+      <p:pic>
+        <p:nvPicPr>
+          <p:cNvPr id="4" name="Picture 3">
+            <a:extLst>
+              <a:ext uri="{FF2B5EF4-FFF2-40B4-BE49-F238E27FC236}">
+                <a16:creationId xmlns:a16="http://schemas.microsoft.com/office/drawing/2014/main" id="{95FB6A37-77BB-423D-A4DC-0B7EFD72CB97}"/>
+              </a:ext>
+            </a:extLst>
+          </p:cNvPr>
+          <p:cNvPicPr>
+            <a:picLocks noChangeAspect="1"/>
+          </p:cNvPicPr>
+          <p:nvPr/>
+        </p:nvPicPr>
+        <p:blipFill>
+          <a:blip r:embed="rId2"/>
+          <a:stretch>
+            <a:fillRect/>
+          </a:stretch>
+        </p:blipFill>
+        <p:spPr>
+          <a:xfrm>
+            <a:off x="2386207" y="3630174"/>
+            <a:ext cx="7256745" cy="2819708"/>
+          </a:xfrm>
+          <a:prstGeom prst="rect">
+            <a:avLst/>
+          </a:prstGeom>
+        </p:spPr>
+      </p:pic>
     </p:spTree>
     <p:extLst>
       <p:ext uri="{BB962C8B-B14F-4D97-AF65-F5344CB8AC3E}">
@@ -3725,7 +3775,7 @@
         </p:nvSpPr>
         <p:spPr>
           <a:xfrm>
-            <a:off x="5799667" y="2774157"/>
+            <a:off x="5655618" y="2856719"/>
             <a:ext cx="1591734" cy="369332"/>
           </a:xfrm>
           <a:prstGeom prst="rect">
@@ -3767,8 +3817,8 @@
         </p:nvCxnSpPr>
         <p:spPr>
           <a:xfrm flipH="1">
-            <a:off x="6096000" y="3143489"/>
-            <a:ext cx="499534" cy="458549"/>
+            <a:off x="6096000" y="3226051"/>
+            <a:ext cx="355485" cy="375987"/>
           </a:xfrm>
           <a:prstGeom prst="straightConnector1">
             <a:avLst/>
@@ -3886,8 +3936,8 @@
         </p:nvSpPr>
         <p:spPr>
           <a:xfrm>
-            <a:off x="6036734" y="4712772"/>
-            <a:ext cx="2997200" cy="369332"/>
+            <a:off x="6712155" y="4451162"/>
+            <a:ext cx="2381741" cy="523220"/>
           </a:xfrm>
           <a:prstGeom prst="rect">
             <a:avLst/>
@@ -3904,13 +3954,190 @@
           <a:lstStyle/>
           <a:p>
             <a:r>
+              <a:rPr lang="en-US" sz="1400" dirty="0"/>
+              <a:t>How to identify DOM cluster?</a:t>
+            </a:r>
+          </a:p>
+          <a:p>
+            <a:r>
+              <a:rPr lang="en-US" sz="1400" dirty="0"/>
+              <a:t>What is DOM cluster?</a:t>
+            </a:r>
+            <a:endParaRPr lang="en-MY" sz="1400" dirty="0"/>
+          </a:p>
+        </p:txBody>
+      </p:sp>
+      <p:sp>
+        <p:nvSpPr>
+          <p:cNvPr id="11" name="TextBox 10">
+            <a:extLst>
+              <a:ext uri="{FF2B5EF4-FFF2-40B4-BE49-F238E27FC236}">
+                <a16:creationId xmlns:a16="http://schemas.microsoft.com/office/drawing/2014/main" id="{D323490D-10DE-499F-A37D-97D28DD81E8E}"/>
+              </a:ext>
+            </a:extLst>
+          </p:cNvPr>
+          <p:cNvSpPr txBox="1"/>
+          <p:nvPr/>
+        </p:nvSpPr>
+        <p:spPr>
+          <a:xfrm>
+            <a:off x="9504219" y="4202014"/>
+            <a:ext cx="2489242" cy="923330"/>
+          </a:xfrm>
+          <a:prstGeom prst="rect">
+            <a:avLst/>
+          </a:prstGeom>
+          <a:solidFill>
+            <a:schemeClr val="accent5"/>
+          </a:solidFill>
+        </p:spPr>
+        <p:txBody>
+          <a:bodyPr wrap="square" rtlCol="0">
+            <a:spAutoFit/>
+          </a:bodyPr>
+          <a:lstStyle/>
+          <a:p>
+            <a:r>
               <a:rPr lang="en-US" dirty="0"/>
-              <a:t>How to identify DOM cluster?</a:t>
+              <a:t>Get from unsupervised clustering based on Jaccard indices</a:t>
             </a:r>
             <a:endParaRPr lang="en-MY" dirty="0"/>
           </a:p>
         </p:txBody>
       </p:sp>
+      <p:cxnSp>
+        <p:nvCxnSpPr>
+          <p:cNvPr id="13" name="Straight Arrow Connector 12">
+            <a:extLst>
+              <a:ext uri="{FF2B5EF4-FFF2-40B4-BE49-F238E27FC236}">
+                <a16:creationId xmlns:a16="http://schemas.microsoft.com/office/drawing/2014/main" id="{09EB245A-1FD7-4082-B049-E91E287006F5}"/>
+              </a:ext>
+            </a:extLst>
+          </p:cNvPr>
+          <p:cNvCxnSpPr>
+            <a:cxnSpLocks/>
+            <a:stCxn id="11" idx="1"/>
+          </p:cNvCxnSpPr>
+          <p:nvPr/>
+        </p:nvCxnSpPr>
+        <p:spPr>
+          <a:xfrm flipH="1" flipV="1">
+            <a:off x="9165619" y="4302700"/>
+            <a:ext cx="338600" cy="360979"/>
+          </a:xfrm>
+          <a:prstGeom prst="straightConnector1">
+            <a:avLst/>
+          </a:prstGeom>
+          <a:ln>
+            <a:tailEnd type="triangle"/>
+          </a:ln>
+        </p:spPr>
+        <p:style>
+          <a:lnRef idx="1">
+            <a:schemeClr val="accent1"/>
+          </a:lnRef>
+          <a:fillRef idx="0">
+            <a:schemeClr val="accent1"/>
+          </a:fillRef>
+          <a:effectRef idx="0">
+            <a:schemeClr val="accent1"/>
+          </a:effectRef>
+          <a:fontRef idx="minor">
+            <a:schemeClr val="tx1"/>
+          </a:fontRef>
+        </p:style>
+      </p:cxnSp>
+      <p:sp>
+        <p:nvSpPr>
+          <p:cNvPr id="16" name="TextBox 15">
+            <a:extLst>
+              <a:ext uri="{FF2B5EF4-FFF2-40B4-BE49-F238E27FC236}">
+                <a16:creationId xmlns:a16="http://schemas.microsoft.com/office/drawing/2014/main" id="{E40F2718-6237-4D8F-8B14-1A16EDBCB8F6}"/>
+              </a:ext>
+            </a:extLst>
+          </p:cNvPr>
+          <p:cNvSpPr txBox="1"/>
+          <p:nvPr/>
+        </p:nvSpPr>
+        <p:spPr>
+          <a:xfrm>
+            <a:off x="3229448" y="4276899"/>
+            <a:ext cx="1345752" cy="461665"/>
+          </a:xfrm>
+          <a:prstGeom prst="rect">
+            <a:avLst/>
+          </a:prstGeom>
+          <a:noFill/>
+        </p:spPr>
+        <p:txBody>
+          <a:bodyPr wrap="square" rtlCol="0">
+            <a:spAutoFit/>
+          </a:bodyPr>
+          <a:lstStyle/>
+          <a:p>
+            <a:r>
+              <a:rPr lang="en-US" sz="2400" b="1" dirty="0">
+                <a:solidFill>
+                  <a:schemeClr val="accent6">
+                    <a:lumMod val="50000"/>
+                  </a:schemeClr>
+                </a:solidFill>
+              </a:rPr>
+              <a:t>diversity</a:t>
+            </a:r>
+            <a:endParaRPr lang="en-MY" sz="2400" b="1" dirty="0">
+              <a:solidFill>
+                <a:schemeClr val="accent6">
+                  <a:lumMod val="50000"/>
+                </a:schemeClr>
+              </a:solidFill>
+            </a:endParaRPr>
+          </a:p>
+        </p:txBody>
+      </p:sp>
+      <p:cxnSp>
+        <p:nvCxnSpPr>
+          <p:cNvPr id="19" name="Straight Connector 18">
+            <a:extLst>
+              <a:ext uri="{FF2B5EF4-FFF2-40B4-BE49-F238E27FC236}">
+                <a16:creationId xmlns:a16="http://schemas.microsoft.com/office/drawing/2014/main" id="{4562FC8A-7C21-45E4-94E7-02331929845F}"/>
+              </a:ext>
+            </a:extLst>
+          </p:cNvPr>
+          <p:cNvCxnSpPr>
+            <a:cxnSpLocks/>
+          </p:cNvCxnSpPr>
+          <p:nvPr/>
+        </p:nvCxnSpPr>
+        <p:spPr>
+          <a:xfrm>
+            <a:off x="3214255" y="4302690"/>
+            <a:ext cx="1283854" cy="0"/>
+          </a:xfrm>
+          <a:prstGeom prst="line">
+            <a:avLst/>
+          </a:prstGeom>
+          <a:ln w="38100">
+            <a:solidFill>
+              <a:schemeClr val="tx1"/>
+            </a:solidFill>
+          </a:ln>
+        </p:spPr>
+        <p:style>
+          <a:lnRef idx="1">
+            <a:schemeClr val="accent1"/>
+          </a:lnRef>
+          <a:fillRef idx="0">
+            <a:schemeClr val="accent1"/>
+          </a:fillRef>
+          <a:effectRef idx="0">
+            <a:schemeClr val="accent1"/>
+          </a:effectRef>
+          <a:fontRef idx="minor">
+            <a:schemeClr val="tx1"/>
+          </a:fontRef>
+        </p:style>
+      </p:cxnSp>
     </p:spTree>
     <p:extLst>
       <p:ext uri="{BB962C8B-B14F-4D97-AF65-F5344CB8AC3E}">
@@ -3946,6 +4173,112 @@
           <p:cNvPr id="2" name="Title 1">
             <a:extLst>
               <a:ext uri="{FF2B5EF4-FFF2-40B4-BE49-F238E27FC236}">
+                <a16:creationId xmlns:a16="http://schemas.microsoft.com/office/drawing/2014/main" id="{6BD30D7C-7BE7-4237-B941-E5714DDC85AC}"/>
+              </a:ext>
+            </a:extLst>
+          </p:cNvPr>
+          <p:cNvSpPr>
+            <a:spLocks noGrp="1"/>
+          </p:cNvSpPr>
+          <p:nvPr>
+            <p:ph type="title"/>
+          </p:nvPr>
+        </p:nvSpPr>
+        <p:spPr/>
+        <p:txBody>
+          <a:bodyPr>
+            <a:noAutofit/>
+          </a:bodyPr>
+          <a:lstStyle/>
+          <a:p>
+            <a:r>
+              <a:rPr lang="en-MY" sz="3600" dirty="0"/>
+              <a:t>Topic 4 – Examining the Ecological Processes Influencing the Assembly of Molecules into OM Assemblages</a:t>
+            </a:r>
+          </a:p>
+        </p:txBody>
+      </p:sp>
+      <p:sp>
+        <p:nvSpPr>
+          <p:cNvPr id="3" name="Rectangle 2">
+            <a:extLst>
+              <a:ext uri="{FF2B5EF4-FFF2-40B4-BE49-F238E27FC236}">
+                <a16:creationId xmlns:a16="http://schemas.microsoft.com/office/drawing/2014/main" id="{C98BF2B1-FB5A-4E25-958D-62755E182449}"/>
+              </a:ext>
+            </a:extLst>
+          </p:cNvPr>
+          <p:cNvSpPr/>
+          <p:nvPr/>
+        </p:nvSpPr>
+        <p:spPr>
+          <a:xfrm>
+            <a:off x="838200" y="1690688"/>
+            <a:ext cx="10515600" cy="4247317"/>
+          </a:xfrm>
+          <a:prstGeom prst="rect">
+            <a:avLst/>
+          </a:prstGeom>
+        </p:spPr>
+        <p:txBody>
+          <a:bodyPr wrap="square">
+            <a:spAutoFit/>
+          </a:bodyPr>
+          <a:lstStyle/>
+          <a:p>
+            <a:r>
+              <a:rPr lang="en-MY" dirty="0"/>
+              <a:t>Dissolved organic matter (DOM) assemblages in freshwaters are formed from complex mixtures of compounds that are highly variable across time and space due to the environmental heterogeneity of river networks and contribution of diverse allochthonous and autochthonous OM sources. We propose that ecologically significant DOM assemblages can be extracted from a continental-scale dataset of fluvial FTICR-MS organic matter molecular characterization, nutrient levels, stable water isotopes (2H and 18O), and other physicochemical parameters. </a:t>
+            </a:r>
+            <a:r>
+              <a:rPr lang="en-MY" dirty="0">
+                <a:solidFill>
+                  <a:srgbClr val="FF0000"/>
+                </a:solidFill>
+              </a:rPr>
+              <a:t>To identify assemblages and trends, we will apply artificial neural networks and machine learning on DOM samples collected across the continental US. </a:t>
+            </a:r>
+            <a:r>
+              <a:rPr lang="en-MY" dirty="0"/>
+              <a:t>Once DOM assemblages are identified we will use variation across space to investigate metabolomic processes in metacommunity ecology and community metabolomes. We will address questions about the origins of DOM assemblages in streams and rivers. Specifically, we will examine the relative importance of biotic vs. abiotic processes, watershed characteristics, coupled nutrient cycles, and sediment metabolism on DOM assemblage formation. We argue that this data-driven approach will reveal common continental-scale DOM assemblages and the metabolomic processes that generate these groups of compounds. Figure 6 shows how we aim to identify assemblages of organic molecules that comprise DOM and relate them to environmental features using artificial neural networks and other machine learning approaches.</a:t>
+            </a:r>
+          </a:p>
+        </p:txBody>
+      </p:sp>
+    </p:spTree>
+    <p:extLst>
+      <p:ext uri="{BB962C8B-B14F-4D97-AF65-F5344CB8AC3E}">
+        <p14:creationId xmlns:p14="http://schemas.microsoft.com/office/powerpoint/2010/main" val="1923908389"/>
+      </p:ext>
+    </p:extLst>
+  </p:cSld>
+  <p:clrMapOvr>
+    <a:masterClrMapping/>
+  </p:clrMapOvr>
+</p:sld>
+</file>
+
+<file path=ppt/slides/slide5.xml><?xml version="1.0" encoding="utf-8"?>
+<p:sld xmlns:a="http://schemas.openxmlformats.org/drawingml/2006/main" xmlns:r="http://schemas.openxmlformats.org/officeDocument/2006/relationships" xmlns:p="http://schemas.openxmlformats.org/presentationml/2006/main">
+  <p:cSld>
+    <p:spTree>
+      <p:nvGrpSpPr>
+        <p:cNvPr id="1" name=""/>
+        <p:cNvGrpSpPr/>
+        <p:nvPr/>
+      </p:nvGrpSpPr>
+      <p:grpSpPr>
+        <a:xfrm>
+          <a:off x="0" y="0"/>
+          <a:ext cx="0" cy="0"/>
+          <a:chOff x="0" y="0"/>
+          <a:chExt cx="0" cy="0"/>
+        </a:xfrm>
+      </p:grpSpPr>
+      <p:sp>
+        <p:nvSpPr>
+          <p:cNvPr id="2" name="Title 1">
+            <a:extLst>
+              <a:ext uri="{FF2B5EF4-FFF2-40B4-BE49-F238E27FC236}">
                 <a16:creationId xmlns:a16="http://schemas.microsoft.com/office/drawing/2014/main" id="{51B2DF35-BDBC-4F44-8F56-C9BE8AE67135}"/>
               </a:ext>
             </a:extLst>
@@ -4131,6 +4464,2918 @@
     <p:extLst>
       <p:ext uri="{BB962C8B-B14F-4D97-AF65-F5344CB8AC3E}">
         <p14:creationId xmlns:p14="http://schemas.microsoft.com/office/powerpoint/2010/main" val="2328817476"/>
+      </p:ext>
+    </p:extLst>
+  </p:cSld>
+  <p:clrMapOvr>
+    <a:masterClrMapping/>
+  </p:clrMapOvr>
+</p:sld>
+</file>
+
+<file path=ppt/slides/slide6.xml><?xml version="1.0" encoding="utf-8"?>
+<p:sld xmlns:a="http://schemas.openxmlformats.org/drawingml/2006/main" xmlns:r="http://schemas.openxmlformats.org/officeDocument/2006/relationships" xmlns:p="http://schemas.openxmlformats.org/presentationml/2006/main">
+  <p:cSld>
+    <p:spTree>
+      <p:nvGrpSpPr>
+        <p:cNvPr id="1" name=""/>
+        <p:cNvGrpSpPr/>
+        <p:nvPr/>
+      </p:nvGrpSpPr>
+      <p:grpSpPr>
+        <a:xfrm>
+          <a:off x="0" y="0"/>
+          <a:ext cx="0" cy="0"/>
+          <a:chOff x="0" y="0"/>
+          <a:chExt cx="0" cy="0"/>
+        </a:xfrm>
+      </p:grpSpPr>
+      <p:sp>
+        <p:nvSpPr>
+          <p:cNvPr id="2" name="Title 1">
+            <a:extLst>
+              <a:ext uri="{FF2B5EF4-FFF2-40B4-BE49-F238E27FC236}">
+                <a16:creationId xmlns:a16="http://schemas.microsoft.com/office/drawing/2014/main" id="{8E512884-2986-42A8-8F4B-098605BBEA9C}"/>
+              </a:ext>
+            </a:extLst>
+          </p:cNvPr>
+          <p:cNvSpPr>
+            <a:spLocks noGrp="1"/>
+          </p:cNvSpPr>
+          <p:nvPr>
+            <p:ph type="title"/>
+          </p:nvPr>
+        </p:nvSpPr>
+        <p:spPr/>
+        <p:txBody>
+          <a:bodyPr/>
+          <a:lstStyle/>
+          <a:p>
+            <a:r>
+              <a:rPr lang="en-US" dirty="0" err="1"/>
+              <a:t>Crosstable</a:t>
+            </a:r>
+            <a:r>
+              <a:rPr lang="en-US" dirty="0"/>
+              <a:t> data</a:t>
+            </a:r>
+            <a:endParaRPr lang="en-MY" dirty="0"/>
+          </a:p>
+        </p:txBody>
+      </p:sp>
+      <p:graphicFrame>
+        <p:nvGraphicFramePr>
+          <p:cNvPr id="6" name="Table 5">
+            <a:extLst>
+              <a:ext uri="{FF2B5EF4-FFF2-40B4-BE49-F238E27FC236}">
+                <a16:creationId xmlns:a16="http://schemas.microsoft.com/office/drawing/2014/main" id="{F13F75EE-7BEF-4035-94A4-1BA5A234A418}"/>
+              </a:ext>
+            </a:extLst>
+          </p:cNvPr>
+          <p:cNvGraphicFramePr>
+            <a:graphicFrameLocks noGrp="1"/>
+          </p:cNvGraphicFramePr>
+          <p:nvPr>
+            <p:extLst>
+              <p:ext uri="{D42A27DB-BD31-4B8C-83A1-F6EECF244321}">
+                <p14:modId xmlns:p14="http://schemas.microsoft.com/office/powerpoint/2010/main" val="1865548089"/>
+              </p:ext>
+            </p:extLst>
+          </p:nvPr>
+        </p:nvGraphicFramePr>
+        <p:xfrm>
+          <a:off x="920663" y="1402915"/>
+          <a:ext cx="4215008" cy="4980571"/>
+        </p:xfrm>
+        <a:graphic>
+          <a:graphicData uri="http://schemas.openxmlformats.org/drawingml/2006/table">
+            <a:tbl>
+              <a:tblPr/>
+              <a:tblGrid>
+                <a:gridCol w="1664755">
+                  <a:extLst>
+                    <a:ext uri="{9D8B030D-6E8A-4147-A177-3AD203B41FA5}">
+                      <a16:colId xmlns:a16="http://schemas.microsoft.com/office/drawing/2014/main" val="2462469032"/>
+                    </a:ext>
+                  </a:extLst>
+                </a:gridCol>
+                <a:gridCol w="2550253">
+                  <a:extLst>
+                    <a:ext uri="{9D8B030D-6E8A-4147-A177-3AD203B41FA5}">
+                      <a16:colId xmlns:a16="http://schemas.microsoft.com/office/drawing/2014/main" val="1093948340"/>
+                    </a:ext>
+                  </a:extLst>
+                </a:gridCol>
+              </a:tblGrid>
+              <a:tr h="227878">
+                <a:tc>
+                  <a:txBody>
+                    <a:bodyPr/>
+                    <a:lstStyle/>
+                    <a:p>
+                      <a:pPr algn="l" fontAlgn="b"/>
+                      <a:r>
+                        <a:rPr lang="en-MY" sz="1600" b="0" i="0" u="none" strike="noStrike" dirty="0">
+                          <a:solidFill>
+                            <a:srgbClr val="000000"/>
+                          </a:solidFill>
+                          <a:effectLst/>
+                          <a:latin typeface="Arial" panose="020B0604020202020204" pitchFamily="34" charset="0"/>
+                          <a:cs typeface="Arial" panose="020B0604020202020204" pitchFamily="34" charset="0"/>
+                        </a:rPr>
+                        <a:t>Mass</a:t>
+                      </a:r>
+                    </a:p>
+                  </a:txBody>
+                  <a:tcPr marL="5620" marR="5620" marT="5620" marB="0" anchor="b">
+                    <a:lnL w="6350" cap="flat" cmpd="sng" algn="ctr">
+                      <a:solidFill>
+                        <a:srgbClr val="000000"/>
+                      </a:solidFill>
+                      <a:prstDash val="solid"/>
+                      <a:round/>
+                      <a:headEnd type="none" w="med" len="med"/>
+                      <a:tailEnd type="none" w="med" len="med"/>
+                    </a:lnL>
+                    <a:lnR w="6350" cap="flat" cmpd="sng" algn="ctr">
+                      <a:solidFill>
+                        <a:srgbClr val="000000"/>
+                      </a:solidFill>
+                      <a:prstDash val="solid"/>
+                      <a:round/>
+                      <a:headEnd type="none" w="med" len="med"/>
+                      <a:tailEnd type="none" w="med" len="med"/>
+                    </a:lnR>
+                    <a:lnT w="6350" cap="flat" cmpd="sng" algn="ctr">
+                      <a:solidFill>
+                        <a:srgbClr val="000000"/>
+                      </a:solidFill>
+                      <a:prstDash val="solid"/>
+                      <a:round/>
+                      <a:headEnd type="none" w="med" len="med"/>
+                      <a:tailEnd type="none" w="med" len="med"/>
+                    </a:lnT>
+                    <a:lnB w="6350" cap="flat" cmpd="sng" algn="ctr">
+                      <a:solidFill>
+                        <a:srgbClr val="000000"/>
+                      </a:solidFill>
+                      <a:prstDash val="solid"/>
+                      <a:round/>
+                      <a:headEnd type="none" w="med" len="med"/>
+                      <a:tailEnd type="none" w="med" len="med"/>
+                    </a:lnB>
+                  </a:tcPr>
+                </a:tc>
+                <a:tc>
+                  <a:txBody>
+                    <a:bodyPr/>
+                    <a:lstStyle/>
+                    <a:p>
+                      <a:pPr algn="l" fontAlgn="b"/>
+                      <a:r>
+                        <a:rPr lang="en-MY" sz="1600" b="0" i="0" u="none" strike="noStrike">
+                          <a:solidFill>
+                            <a:srgbClr val="000000"/>
+                          </a:solidFill>
+                          <a:effectLst/>
+                          <a:latin typeface="Arial" panose="020B0604020202020204" pitchFamily="34" charset="0"/>
+                          <a:cs typeface="Arial" panose="020B0604020202020204" pitchFamily="34" charset="0"/>
+                        </a:rPr>
+                        <a:t>GFE</a:t>
+                      </a:r>
+                    </a:p>
+                  </a:txBody>
+                  <a:tcPr marL="5620" marR="5620" marT="5620" marB="0" anchor="b">
+                    <a:lnL w="6350" cap="flat" cmpd="sng" algn="ctr">
+                      <a:solidFill>
+                        <a:srgbClr val="000000"/>
+                      </a:solidFill>
+                      <a:prstDash val="solid"/>
+                      <a:round/>
+                      <a:headEnd type="none" w="med" len="med"/>
+                      <a:tailEnd type="none" w="med" len="med"/>
+                    </a:lnL>
+                    <a:lnR w="6350" cap="flat" cmpd="sng" algn="ctr">
+                      <a:solidFill>
+                        <a:srgbClr val="000000"/>
+                      </a:solidFill>
+                      <a:prstDash val="solid"/>
+                      <a:round/>
+                      <a:headEnd type="none" w="med" len="med"/>
+                      <a:tailEnd type="none" w="med" len="med"/>
+                    </a:lnR>
+                    <a:lnT w="6350" cap="flat" cmpd="sng" algn="ctr">
+                      <a:solidFill>
+                        <a:srgbClr val="000000"/>
+                      </a:solidFill>
+                      <a:prstDash val="solid"/>
+                      <a:round/>
+                      <a:headEnd type="none" w="med" len="med"/>
+                      <a:tailEnd type="none" w="med" len="med"/>
+                    </a:lnT>
+                    <a:lnB w="6350" cap="flat" cmpd="sng" algn="ctr">
+                      <a:solidFill>
+                        <a:srgbClr val="000000"/>
+                      </a:solidFill>
+                      <a:prstDash val="solid"/>
+                      <a:round/>
+                      <a:headEnd type="none" w="med" len="med"/>
+                      <a:tailEnd type="none" w="med" len="med"/>
+                    </a:lnB>
+                  </a:tcPr>
+                </a:tc>
+                <a:extLst>
+                  <a:ext uri="{0D108BD9-81ED-4DB2-BD59-A6C34878D82A}">
+                    <a16:rowId xmlns:a16="http://schemas.microsoft.com/office/drawing/2014/main" val="1639281258"/>
+                  </a:ext>
+                </a:extLst>
+              </a:tr>
+              <a:tr h="276219">
+                <a:tc>
+                  <a:txBody>
+                    <a:bodyPr/>
+                    <a:lstStyle/>
+                    <a:p>
+                      <a:pPr algn="l" fontAlgn="b"/>
+                      <a:r>
+                        <a:rPr lang="en-MY" sz="1600" b="0" i="0" u="none" strike="noStrike" dirty="0">
+                          <a:solidFill>
+                            <a:srgbClr val="000000"/>
+                          </a:solidFill>
+                          <a:effectLst/>
+                          <a:latin typeface="Arial" panose="020B0604020202020204" pitchFamily="34" charset="0"/>
+                          <a:cs typeface="Arial" panose="020B0604020202020204" pitchFamily="34" charset="0"/>
+                        </a:rPr>
+                        <a:t>C</a:t>
+                      </a:r>
+                    </a:p>
+                  </a:txBody>
+                  <a:tcPr marL="5620" marR="5620" marT="5620" marB="0" anchor="b">
+                    <a:lnL w="6350" cap="flat" cmpd="sng" algn="ctr">
+                      <a:solidFill>
+                        <a:srgbClr val="000000"/>
+                      </a:solidFill>
+                      <a:prstDash val="solid"/>
+                      <a:round/>
+                      <a:headEnd type="none" w="med" len="med"/>
+                      <a:tailEnd type="none" w="med" len="med"/>
+                    </a:lnL>
+                    <a:lnR w="6350" cap="flat" cmpd="sng" algn="ctr">
+                      <a:solidFill>
+                        <a:srgbClr val="000000"/>
+                      </a:solidFill>
+                      <a:prstDash val="solid"/>
+                      <a:round/>
+                      <a:headEnd type="none" w="med" len="med"/>
+                      <a:tailEnd type="none" w="med" len="med"/>
+                    </a:lnR>
+                    <a:lnT w="6350" cap="flat" cmpd="sng" algn="ctr">
+                      <a:solidFill>
+                        <a:srgbClr val="000000"/>
+                      </a:solidFill>
+                      <a:prstDash val="solid"/>
+                      <a:round/>
+                      <a:headEnd type="none" w="med" len="med"/>
+                      <a:tailEnd type="none" w="med" len="med"/>
+                    </a:lnT>
+                    <a:lnB w="6350" cap="flat" cmpd="sng" algn="ctr">
+                      <a:solidFill>
+                        <a:srgbClr val="000000"/>
+                      </a:solidFill>
+                      <a:prstDash val="solid"/>
+                      <a:round/>
+                      <a:headEnd type="none" w="med" len="med"/>
+                      <a:tailEnd type="none" w="med" len="med"/>
+                    </a:lnB>
+                  </a:tcPr>
+                </a:tc>
+                <a:tc>
+                  <a:txBody>
+                    <a:bodyPr/>
+                    <a:lstStyle/>
+                    <a:p>
+                      <a:pPr algn="l" fontAlgn="b"/>
+                      <a:r>
+                        <a:rPr lang="en-MY" sz="1600" b="0" i="0" u="none" strike="noStrike">
+                          <a:solidFill>
+                            <a:srgbClr val="000000"/>
+                          </a:solidFill>
+                          <a:effectLst/>
+                          <a:latin typeface="Arial" panose="020B0604020202020204" pitchFamily="34" charset="0"/>
+                          <a:cs typeface="Arial" panose="020B0604020202020204" pitchFamily="34" charset="0"/>
+                        </a:rPr>
+                        <a:t>kmass.CH2</a:t>
+                      </a:r>
+                    </a:p>
+                  </a:txBody>
+                  <a:tcPr marL="5620" marR="5620" marT="5620" marB="0" anchor="b">
+                    <a:lnL w="6350" cap="flat" cmpd="sng" algn="ctr">
+                      <a:solidFill>
+                        <a:srgbClr val="000000"/>
+                      </a:solidFill>
+                      <a:prstDash val="solid"/>
+                      <a:round/>
+                      <a:headEnd type="none" w="med" len="med"/>
+                      <a:tailEnd type="none" w="med" len="med"/>
+                    </a:lnL>
+                    <a:lnR w="6350" cap="flat" cmpd="sng" algn="ctr">
+                      <a:solidFill>
+                        <a:srgbClr val="000000"/>
+                      </a:solidFill>
+                      <a:prstDash val="solid"/>
+                      <a:round/>
+                      <a:headEnd type="none" w="med" len="med"/>
+                      <a:tailEnd type="none" w="med" len="med"/>
+                    </a:lnR>
+                    <a:lnT w="6350" cap="flat" cmpd="sng" algn="ctr">
+                      <a:solidFill>
+                        <a:srgbClr val="000000"/>
+                      </a:solidFill>
+                      <a:prstDash val="solid"/>
+                      <a:round/>
+                      <a:headEnd type="none" w="med" len="med"/>
+                      <a:tailEnd type="none" w="med" len="med"/>
+                    </a:lnT>
+                    <a:lnB w="6350" cap="flat" cmpd="sng" algn="ctr">
+                      <a:solidFill>
+                        <a:srgbClr val="000000"/>
+                      </a:solidFill>
+                      <a:prstDash val="solid"/>
+                      <a:round/>
+                      <a:headEnd type="none" w="med" len="med"/>
+                      <a:tailEnd type="none" w="med" len="med"/>
+                    </a:lnB>
+                  </a:tcPr>
+                </a:tc>
+                <a:extLst>
+                  <a:ext uri="{0D108BD9-81ED-4DB2-BD59-A6C34878D82A}">
+                    <a16:rowId xmlns:a16="http://schemas.microsoft.com/office/drawing/2014/main" val="970281319"/>
+                  </a:ext>
+                </a:extLst>
+              </a:tr>
+              <a:tr h="276219">
+                <a:tc>
+                  <a:txBody>
+                    <a:bodyPr/>
+                    <a:lstStyle/>
+                    <a:p>
+                      <a:pPr algn="l" fontAlgn="b"/>
+                      <a:r>
+                        <a:rPr lang="en-MY" sz="1600" b="0" i="0" u="none" strike="noStrike">
+                          <a:solidFill>
+                            <a:srgbClr val="000000"/>
+                          </a:solidFill>
+                          <a:effectLst/>
+                          <a:latin typeface="Arial" panose="020B0604020202020204" pitchFamily="34" charset="0"/>
+                          <a:cs typeface="Arial" panose="020B0604020202020204" pitchFamily="34" charset="0"/>
+                        </a:rPr>
+                        <a:t>H</a:t>
+                      </a:r>
+                    </a:p>
+                  </a:txBody>
+                  <a:tcPr marL="5620" marR="5620" marT="5620" marB="0" anchor="b">
+                    <a:lnL w="6350" cap="flat" cmpd="sng" algn="ctr">
+                      <a:solidFill>
+                        <a:srgbClr val="000000"/>
+                      </a:solidFill>
+                      <a:prstDash val="solid"/>
+                      <a:round/>
+                      <a:headEnd type="none" w="med" len="med"/>
+                      <a:tailEnd type="none" w="med" len="med"/>
+                    </a:lnL>
+                    <a:lnR w="6350" cap="flat" cmpd="sng" algn="ctr">
+                      <a:solidFill>
+                        <a:srgbClr val="000000"/>
+                      </a:solidFill>
+                      <a:prstDash val="solid"/>
+                      <a:round/>
+                      <a:headEnd type="none" w="med" len="med"/>
+                      <a:tailEnd type="none" w="med" len="med"/>
+                    </a:lnR>
+                    <a:lnT w="6350" cap="flat" cmpd="sng" algn="ctr">
+                      <a:solidFill>
+                        <a:srgbClr val="000000"/>
+                      </a:solidFill>
+                      <a:prstDash val="solid"/>
+                      <a:round/>
+                      <a:headEnd type="none" w="med" len="med"/>
+                      <a:tailEnd type="none" w="med" len="med"/>
+                    </a:lnT>
+                    <a:lnB w="6350" cap="flat" cmpd="sng" algn="ctr">
+                      <a:solidFill>
+                        <a:srgbClr val="000000"/>
+                      </a:solidFill>
+                      <a:prstDash val="solid"/>
+                      <a:round/>
+                      <a:headEnd type="none" w="med" len="med"/>
+                      <a:tailEnd type="none" w="med" len="med"/>
+                    </a:lnB>
+                  </a:tcPr>
+                </a:tc>
+                <a:tc>
+                  <a:txBody>
+                    <a:bodyPr/>
+                    <a:lstStyle/>
+                    <a:p>
+                      <a:pPr algn="l" fontAlgn="b"/>
+                      <a:r>
+                        <a:rPr lang="en-MY" sz="1600" b="0" i="0" u="none" strike="noStrike">
+                          <a:solidFill>
+                            <a:srgbClr val="000000"/>
+                          </a:solidFill>
+                          <a:effectLst/>
+                          <a:latin typeface="Arial" panose="020B0604020202020204" pitchFamily="34" charset="0"/>
+                          <a:cs typeface="Arial" panose="020B0604020202020204" pitchFamily="34" charset="0"/>
+                        </a:rPr>
+                        <a:t>kdefect.CH2</a:t>
+                      </a:r>
+                    </a:p>
+                  </a:txBody>
+                  <a:tcPr marL="5620" marR="5620" marT="5620" marB="0" anchor="b">
+                    <a:lnL w="6350" cap="flat" cmpd="sng" algn="ctr">
+                      <a:solidFill>
+                        <a:srgbClr val="000000"/>
+                      </a:solidFill>
+                      <a:prstDash val="solid"/>
+                      <a:round/>
+                      <a:headEnd type="none" w="med" len="med"/>
+                      <a:tailEnd type="none" w="med" len="med"/>
+                    </a:lnL>
+                    <a:lnR w="6350" cap="flat" cmpd="sng" algn="ctr">
+                      <a:solidFill>
+                        <a:srgbClr val="000000"/>
+                      </a:solidFill>
+                      <a:prstDash val="solid"/>
+                      <a:round/>
+                      <a:headEnd type="none" w="med" len="med"/>
+                      <a:tailEnd type="none" w="med" len="med"/>
+                    </a:lnR>
+                    <a:lnT w="6350" cap="flat" cmpd="sng" algn="ctr">
+                      <a:solidFill>
+                        <a:srgbClr val="000000"/>
+                      </a:solidFill>
+                      <a:prstDash val="solid"/>
+                      <a:round/>
+                      <a:headEnd type="none" w="med" len="med"/>
+                      <a:tailEnd type="none" w="med" len="med"/>
+                    </a:lnT>
+                    <a:lnB w="6350" cap="flat" cmpd="sng" algn="ctr">
+                      <a:solidFill>
+                        <a:srgbClr val="000000"/>
+                      </a:solidFill>
+                      <a:prstDash val="solid"/>
+                      <a:round/>
+                      <a:headEnd type="none" w="med" len="med"/>
+                      <a:tailEnd type="none" w="med" len="med"/>
+                    </a:lnB>
+                  </a:tcPr>
+                </a:tc>
+                <a:extLst>
+                  <a:ext uri="{0D108BD9-81ED-4DB2-BD59-A6C34878D82A}">
+                    <a16:rowId xmlns:a16="http://schemas.microsoft.com/office/drawing/2014/main" val="2729830172"/>
+                  </a:ext>
+                </a:extLst>
+              </a:tr>
+              <a:tr h="227878">
+                <a:tc>
+                  <a:txBody>
+                    <a:bodyPr/>
+                    <a:lstStyle/>
+                    <a:p>
+                      <a:pPr algn="l" fontAlgn="b"/>
+                      <a:r>
+                        <a:rPr lang="en-MY" sz="1600" b="0" i="0" u="none" strike="noStrike" dirty="0">
+                          <a:solidFill>
+                            <a:srgbClr val="000000"/>
+                          </a:solidFill>
+                          <a:effectLst/>
+                          <a:latin typeface="Arial" panose="020B0604020202020204" pitchFamily="34" charset="0"/>
+                          <a:cs typeface="Arial" panose="020B0604020202020204" pitchFamily="34" charset="0"/>
+                        </a:rPr>
+                        <a:t>O</a:t>
+                      </a:r>
+                    </a:p>
+                  </a:txBody>
+                  <a:tcPr marL="5620" marR="5620" marT="5620" marB="0" anchor="b">
+                    <a:lnL w="6350" cap="flat" cmpd="sng" algn="ctr">
+                      <a:solidFill>
+                        <a:srgbClr val="000000"/>
+                      </a:solidFill>
+                      <a:prstDash val="solid"/>
+                      <a:round/>
+                      <a:headEnd type="none" w="med" len="med"/>
+                      <a:tailEnd type="none" w="med" len="med"/>
+                    </a:lnL>
+                    <a:lnR w="6350" cap="flat" cmpd="sng" algn="ctr">
+                      <a:solidFill>
+                        <a:srgbClr val="000000"/>
+                      </a:solidFill>
+                      <a:prstDash val="solid"/>
+                      <a:round/>
+                      <a:headEnd type="none" w="med" len="med"/>
+                      <a:tailEnd type="none" w="med" len="med"/>
+                    </a:lnR>
+                    <a:lnT w="6350" cap="flat" cmpd="sng" algn="ctr">
+                      <a:solidFill>
+                        <a:srgbClr val="000000"/>
+                      </a:solidFill>
+                      <a:prstDash val="solid"/>
+                      <a:round/>
+                      <a:headEnd type="none" w="med" len="med"/>
+                      <a:tailEnd type="none" w="med" len="med"/>
+                    </a:lnT>
+                    <a:lnB w="6350" cap="flat" cmpd="sng" algn="ctr">
+                      <a:solidFill>
+                        <a:srgbClr val="000000"/>
+                      </a:solidFill>
+                      <a:prstDash val="solid"/>
+                      <a:round/>
+                      <a:headEnd type="none" w="med" len="med"/>
+                      <a:tailEnd type="none" w="med" len="med"/>
+                    </a:lnB>
+                  </a:tcPr>
+                </a:tc>
+                <a:tc>
+                  <a:txBody>
+                    <a:bodyPr/>
+                    <a:lstStyle/>
+                    <a:p>
+                      <a:pPr algn="l" fontAlgn="b"/>
+                      <a:r>
+                        <a:rPr lang="en-MY" sz="1600" b="0" i="0" u="none" strike="noStrike">
+                          <a:solidFill>
+                            <a:srgbClr val="000000"/>
+                          </a:solidFill>
+                          <a:effectLst/>
+                          <a:latin typeface="Arial" panose="020B0604020202020204" pitchFamily="34" charset="0"/>
+                          <a:cs typeface="Arial" panose="020B0604020202020204" pitchFamily="34" charset="0"/>
+                        </a:rPr>
+                        <a:t>NOSC</a:t>
+                      </a:r>
+                    </a:p>
+                  </a:txBody>
+                  <a:tcPr marL="5620" marR="5620" marT="5620" marB="0" anchor="b">
+                    <a:lnL w="6350" cap="flat" cmpd="sng" algn="ctr">
+                      <a:solidFill>
+                        <a:srgbClr val="000000"/>
+                      </a:solidFill>
+                      <a:prstDash val="solid"/>
+                      <a:round/>
+                      <a:headEnd type="none" w="med" len="med"/>
+                      <a:tailEnd type="none" w="med" len="med"/>
+                    </a:lnL>
+                    <a:lnR w="6350" cap="flat" cmpd="sng" algn="ctr">
+                      <a:solidFill>
+                        <a:srgbClr val="000000"/>
+                      </a:solidFill>
+                      <a:prstDash val="solid"/>
+                      <a:round/>
+                      <a:headEnd type="none" w="med" len="med"/>
+                      <a:tailEnd type="none" w="med" len="med"/>
+                    </a:lnR>
+                    <a:lnT w="6350" cap="flat" cmpd="sng" algn="ctr">
+                      <a:solidFill>
+                        <a:srgbClr val="000000"/>
+                      </a:solidFill>
+                      <a:prstDash val="solid"/>
+                      <a:round/>
+                      <a:headEnd type="none" w="med" len="med"/>
+                      <a:tailEnd type="none" w="med" len="med"/>
+                    </a:lnT>
+                    <a:lnB w="6350" cap="flat" cmpd="sng" algn="ctr">
+                      <a:solidFill>
+                        <a:srgbClr val="000000"/>
+                      </a:solidFill>
+                      <a:prstDash val="solid"/>
+                      <a:round/>
+                      <a:headEnd type="none" w="med" len="med"/>
+                      <a:tailEnd type="none" w="med" len="med"/>
+                    </a:lnB>
+                  </a:tcPr>
+                </a:tc>
+                <a:extLst>
+                  <a:ext uri="{0D108BD9-81ED-4DB2-BD59-A6C34878D82A}">
+                    <a16:rowId xmlns:a16="http://schemas.microsoft.com/office/drawing/2014/main" val="2476493288"/>
+                  </a:ext>
+                </a:extLst>
+              </a:tr>
+              <a:tr h="276219">
+                <a:tc>
+                  <a:txBody>
+                    <a:bodyPr/>
+                    <a:lstStyle/>
+                    <a:p>
+                      <a:pPr algn="l" fontAlgn="b"/>
+                      <a:r>
+                        <a:rPr lang="en-MY" sz="1600" b="0" i="0" u="none" strike="noStrike" dirty="0">
+                          <a:solidFill>
+                            <a:srgbClr val="000000"/>
+                          </a:solidFill>
+                          <a:effectLst/>
+                          <a:latin typeface="Arial" panose="020B0604020202020204" pitchFamily="34" charset="0"/>
+                          <a:cs typeface="Arial" panose="020B0604020202020204" pitchFamily="34" charset="0"/>
+                        </a:rPr>
+                        <a:t>N</a:t>
+                      </a:r>
+                    </a:p>
+                  </a:txBody>
+                  <a:tcPr marL="5620" marR="5620" marT="5620" marB="0" anchor="b">
+                    <a:lnL w="6350" cap="flat" cmpd="sng" algn="ctr">
+                      <a:solidFill>
+                        <a:srgbClr val="000000"/>
+                      </a:solidFill>
+                      <a:prstDash val="solid"/>
+                      <a:round/>
+                      <a:headEnd type="none" w="med" len="med"/>
+                      <a:tailEnd type="none" w="med" len="med"/>
+                    </a:lnL>
+                    <a:lnR w="6350" cap="flat" cmpd="sng" algn="ctr">
+                      <a:solidFill>
+                        <a:srgbClr val="000000"/>
+                      </a:solidFill>
+                      <a:prstDash val="solid"/>
+                      <a:round/>
+                      <a:headEnd type="none" w="med" len="med"/>
+                      <a:tailEnd type="none" w="med" len="med"/>
+                    </a:lnR>
+                    <a:lnT w="6350" cap="flat" cmpd="sng" algn="ctr">
+                      <a:solidFill>
+                        <a:srgbClr val="000000"/>
+                      </a:solidFill>
+                      <a:prstDash val="solid"/>
+                      <a:round/>
+                      <a:headEnd type="none" w="med" len="med"/>
+                      <a:tailEnd type="none" w="med" len="med"/>
+                    </a:lnT>
+                    <a:lnB w="6350" cap="flat" cmpd="sng" algn="ctr">
+                      <a:solidFill>
+                        <a:srgbClr val="000000"/>
+                      </a:solidFill>
+                      <a:prstDash val="solid"/>
+                      <a:round/>
+                      <a:headEnd type="none" w="med" len="med"/>
+                      <a:tailEnd type="none" w="med" len="med"/>
+                    </a:lnB>
+                  </a:tcPr>
+                </a:tc>
+                <a:tc>
+                  <a:txBody>
+                    <a:bodyPr/>
+                    <a:lstStyle/>
+                    <a:p>
+                      <a:pPr algn="l" fontAlgn="b"/>
+                      <a:r>
+                        <a:rPr lang="en-MY" sz="1600" b="0" i="0" u="none" strike="noStrike" dirty="0" err="1">
+                          <a:solidFill>
+                            <a:srgbClr val="000000"/>
+                          </a:solidFill>
+                          <a:effectLst/>
+                          <a:latin typeface="Arial" panose="020B0604020202020204" pitchFamily="34" charset="0"/>
+                          <a:cs typeface="Arial" panose="020B0604020202020204" pitchFamily="34" charset="0"/>
+                        </a:rPr>
+                        <a:t>OtoC_ratio</a:t>
+                      </a:r>
+                      <a:endParaRPr lang="en-MY" sz="1600" b="0" i="0" u="none" strike="noStrike" dirty="0">
+                        <a:solidFill>
+                          <a:srgbClr val="000000"/>
+                        </a:solidFill>
+                        <a:effectLst/>
+                        <a:latin typeface="Arial" panose="020B0604020202020204" pitchFamily="34" charset="0"/>
+                        <a:cs typeface="Arial" panose="020B0604020202020204" pitchFamily="34" charset="0"/>
+                      </a:endParaRPr>
+                    </a:p>
+                  </a:txBody>
+                  <a:tcPr marL="5620" marR="5620" marT="5620" marB="0" anchor="b">
+                    <a:lnL w="6350" cap="flat" cmpd="sng" algn="ctr">
+                      <a:solidFill>
+                        <a:srgbClr val="000000"/>
+                      </a:solidFill>
+                      <a:prstDash val="solid"/>
+                      <a:round/>
+                      <a:headEnd type="none" w="med" len="med"/>
+                      <a:tailEnd type="none" w="med" len="med"/>
+                    </a:lnL>
+                    <a:lnR w="6350" cap="flat" cmpd="sng" algn="ctr">
+                      <a:solidFill>
+                        <a:srgbClr val="000000"/>
+                      </a:solidFill>
+                      <a:prstDash val="solid"/>
+                      <a:round/>
+                      <a:headEnd type="none" w="med" len="med"/>
+                      <a:tailEnd type="none" w="med" len="med"/>
+                    </a:lnR>
+                    <a:lnT w="6350" cap="flat" cmpd="sng" algn="ctr">
+                      <a:solidFill>
+                        <a:srgbClr val="000000"/>
+                      </a:solidFill>
+                      <a:prstDash val="solid"/>
+                      <a:round/>
+                      <a:headEnd type="none" w="med" len="med"/>
+                      <a:tailEnd type="none" w="med" len="med"/>
+                    </a:lnT>
+                    <a:lnB w="6350" cap="flat" cmpd="sng" algn="ctr">
+                      <a:solidFill>
+                        <a:srgbClr val="000000"/>
+                      </a:solidFill>
+                      <a:prstDash val="solid"/>
+                      <a:round/>
+                      <a:headEnd type="none" w="med" len="med"/>
+                      <a:tailEnd type="none" w="med" len="med"/>
+                    </a:lnB>
+                  </a:tcPr>
+                </a:tc>
+                <a:extLst>
+                  <a:ext uri="{0D108BD9-81ED-4DB2-BD59-A6C34878D82A}">
+                    <a16:rowId xmlns:a16="http://schemas.microsoft.com/office/drawing/2014/main" val="3578882070"/>
+                  </a:ext>
+                </a:extLst>
+              </a:tr>
+              <a:tr h="276219">
+                <a:tc>
+                  <a:txBody>
+                    <a:bodyPr/>
+                    <a:lstStyle/>
+                    <a:p>
+                      <a:pPr algn="l" fontAlgn="b"/>
+                      <a:r>
+                        <a:rPr lang="en-MY" sz="1600" b="0" i="0" u="none" strike="noStrike">
+                          <a:solidFill>
+                            <a:srgbClr val="000000"/>
+                          </a:solidFill>
+                          <a:effectLst/>
+                          <a:latin typeface="Arial" panose="020B0604020202020204" pitchFamily="34" charset="0"/>
+                          <a:cs typeface="Arial" panose="020B0604020202020204" pitchFamily="34" charset="0"/>
+                        </a:rPr>
+                        <a:t>C13</a:t>
+                      </a:r>
+                    </a:p>
+                  </a:txBody>
+                  <a:tcPr marL="5620" marR="5620" marT="5620" marB="0" anchor="b">
+                    <a:lnL w="6350" cap="flat" cmpd="sng" algn="ctr">
+                      <a:solidFill>
+                        <a:srgbClr val="000000"/>
+                      </a:solidFill>
+                      <a:prstDash val="solid"/>
+                      <a:round/>
+                      <a:headEnd type="none" w="med" len="med"/>
+                      <a:tailEnd type="none" w="med" len="med"/>
+                    </a:lnL>
+                    <a:lnR w="6350" cap="flat" cmpd="sng" algn="ctr">
+                      <a:solidFill>
+                        <a:srgbClr val="000000"/>
+                      </a:solidFill>
+                      <a:prstDash val="solid"/>
+                      <a:round/>
+                      <a:headEnd type="none" w="med" len="med"/>
+                      <a:tailEnd type="none" w="med" len="med"/>
+                    </a:lnR>
+                    <a:lnT w="6350" cap="flat" cmpd="sng" algn="ctr">
+                      <a:solidFill>
+                        <a:srgbClr val="000000"/>
+                      </a:solidFill>
+                      <a:prstDash val="solid"/>
+                      <a:round/>
+                      <a:headEnd type="none" w="med" len="med"/>
+                      <a:tailEnd type="none" w="med" len="med"/>
+                    </a:lnT>
+                    <a:lnB w="6350" cap="flat" cmpd="sng" algn="ctr">
+                      <a:solidFill>
+                        <a:srgbClr val="000000"/>
+                      </a:solidFill>
+                      <a:prstDash val="solid"/>
+                      <a:round/>
+                      <a:headEnd type="none" w="med" len="med"/>
+                      <a:tailEnd type="none" w="med" len="med"/>
+                    </a:lnB>
+                  </a:tcPr>
+                </a:tc>
+                <a:tc>
+                  <a:txBody>
+                    <a:bodyPr/>
+                    <a:lstStyle/>
+                    <a:p>
+                      <a:pPr algn="l" fontAlgn="b"/>
+                      <a:r>
+                        <a:rPr lang="en-MY" sz="1600" b="0" i="0" u="none" strike="noStrike" dirty="0" err="1">
+                          <a:solidFill>
+                            <a:srgbClr val="000000"/>
+                          </a:solidFill>
+                          <a:effectLst/>
+                          <a:latin typeface="Arial" panose="020B0604020202020204" pitchFamily="34" charset="0"/>
+                          <a:cs typeface="Arial" panose="020B0604020202020204" pitchFamily="34" charset="0"/>
+                        </a:rPr>
+                        <a:t>HtoC_ratio</a:t>
+                      </a:r>
+                      <a:endParaRPr lang="en-MY" sz="1600" b="0" i="0" u="none" strike="noStrike" dirty="0">
+                        <a:solidFill>
+                          <a:srgbClr val="000000"/>
+                        </a:solidFill>
+                        <a:effectLst/>
+                        <a:latin typeface="Arial" panose="020B0604020202020204" pitchFamily="34" charset="0"/>
+                        <a:cs typeface="Arial" panose="020B0604020202020204" pitchFamily="34" charset="0"/>
+                      </a:endParaRPr>
+                    </a:p>
+                  </a:txBody>
+                  <a:tcPr marL="5620" marR="5620" marT="5620" marB="0" anchor="b">
+                    <a:lnL w="6350" cap="flat" cmpd="sng" algn="ctr">
+                      <a:solidFill>
+                        <a:srgbClr val="000000"/>
+                      </a:solidFill>
+                      <a:prstDash val="solid"/>
+                      <a:round/>
+                      <a:headEnd type="none" w="med" len="med"/>
+                      <a:tailEnd type="none" w="med" len="med"/>
+                    </a:lnL>
+                    <a:lnR w="6350" cap="flat" cmpd="sng" algn="ctr">
+                      <a:solidFill>
+                        <a:srgbClr val="000000"/>
+                      </a:solidFill>
+                      <a:prstDash val="solid"/>
+                      <a:round/>
+                      <a:headEnd type="none" w="med" len="med"/>
+                      <a:tailEnd type="none" w="med" len="med"/>
+                    </a:lnR>
+                    <a:lnT w="6350" cap="flat" cmpd="sng" algn="ctr">
+                      <a:solidFill>
+                        <a:srgbClr val="000000"/>
+                      </a:solidFill>
+                      <a:prstDash val="solid"/>
+                      <a:round/>
+                      <a:headEnd type="none" w="med" len="med"/>
+                      <a:tailEnd type="none" w="med" len="med"/>
+                    </a:lnT>
+                    <a:lnB w="6350" cap="flat" cmpd="sng" algn="ctr">
+                      <a:solidFill>
+                        <a:srgbClr val="000000"/>
+                      </a:solidFill>
+                      <a:prstDash val="solid"/>
+                      <a:round/>
+                      <a:headEnd type="none" w="med" len="med"/>
+                      <a:tailEnd type="none" w="med" len="med"/>
+                    </a:lnB>
+                  </a:tcPr>
+                </a:tc>
+                <a:extLst>
+                  <a:ext uri="{0D108BD9-81ED-4DB2-BD59-A6C34878D82A}">
+                    <a16:rowId xmlns:a16="http://schemas.microsoft.com/office/drawing/2014/main" val="3551877916"/>
+                  </a:ext>
+                </a:extLst>
+              </a:tr>
+              <a:tr h="276219">
+                <a:tc>
+                  <a:txBody>
+                    <a:bodyPr/>
+                    <a:lstStyle/>
+                    <a:p>
+                      <a:pPr algn="l" fontAlgn="b"/>
+                      <a:r>
+                        <a:rPr lang="en-MY" sz="1600" b="0" i="0" u="none" strike="noStrike">
+                          <a:solidFill>
+                            <a:srgbClr val="000000"/>
+                          </a:solidFill>
+                          <a:effectLst/>
+                          <a:latin typeface="Arial" panose="020B0604020202020204" pitchFamily="34" charset="0"/>
+                          <a:cs typeface="Arial" panose="020B0604020202020204" pitchFamily="34" charset="0"/>
+                        </a:rPr>
+                        <a:t>S</a:t>
+                      </a:r>
+                    </a:p>
+                  </a:txBody>
+                  <a:tcPr marL="5620" marR="5620" marT="5620" marB="0" anchor="b">
+                    <a:lnL w="6350" cap="flat" cmpd="sng" algn="ctr">
+                      <a:solidFill>
+                        <a:srgbClr val="000000"/>
+                      </a:solidFill>
+                      <a:prstDash val="solid"/>
+                      <a:round/>
+                      <a:headEnd type="none" w="med" len="med"/>
+                      <a:tailEnd type="none" w="med" len="med"/>
+                    </a:lnL>
+                    <a:lnR w="6350" cap="flat" cmpd="sng" algn="ctr">
+                      <a:solidFill>
+                        <a:srgbClr val="000000"/>
+                      </a:solidFill>
+                      <a:prstDash val="solid"/>
+                      <a:round/>
+                      <a:headEnd type="none" w="med" len="med"/>
+                      <a:tailEnd type="none" w="med" len="med"/>
+                    </a:lnR>
+                    <a:lnT w="6350" cap="flat" cmpd="sng" algn="ctr">
+                      <a:solidFill>
+                        <a:srgbClr val="000000"/>
+                      </a:solidFill>
+                      <a:prstDash val="solid"/>
+                      <a:round/>
+                      <a:headEnd type="none" w="med" len="med"/>
+                      <a:tailEnd type="none" w="med" len="med"/>
+                    </a:lnT>
+                    <a:lnB w="6350" cap="flat" cmpd="sng" algn="ctr">
+                      <a:solidFill>
+                        <a:srgbClr val="000000"/>
+                      </a:solidFill>
+                      <a:prstDash val="solid"/>
+                      <a:round/>
+                      <a:headEnd type="none" w="med" len="med"/>
+                      <a:tailEnd type="none" w="med" len="med"/>
+                    </a:lnB>
+                  </a:tcPr>
+                </a:tc>
+                <a:tc>
+                  <a:txBody>
+                    <a:bodyPr/>
+                    <a:lstStyle/>
+                    <a:p>
+                      <a:pPr algn="l" fontAlgn="b"/>
+                      <a:r>
+                        <a:rPr lang="en-MY" sz="1600" b="0" i="0" u="none" strike="noStrike" dirty="0" err="1">
+                          <a:solidFill>
+                            <a:srgbClr val="000000"/>
+                          </a:solidFill>
+                          <a:effectLst/>
+                          <a:latin typeface="Arial" panose="020B0604020202020204" pitchFamily="34" charset="0"/>
+                          <a:cs typeface="Arial" panose="020B0604020202020204" pitchFamily="34" charset="0"/>
+                        </a:rPr>
+                        <a:t>NtoC_ratio</a:t>
+                      </a:r>
+                      <a:endParaRPr lang="en-MY" sz="1600" b="0" i="0" u="none" strike="noStrike" dirty="0">
+                        <a:solidFill>
+                          <a:srgbClr val="000000"/>
+                        </a:solidFill>
+                        <a:effectLst/>
+                        <a:latin typeface="Arial" panose="020B0604020202020204" pitchFamily="34" charset="0"/>
+                        <a:cs typeface="Arial" panose="020B0604020202020204" pitchFamily="34" charset="0"/>
+                      </a:endParaRPr>
+                    </a:p>
+                  </a:txBody>
+                  <a:tcPr marL="5620" marR="5620" marT="5620" marB="0" anchor="b">
+                    <a:lnL w="6350" cap="flat" cmpd="sng" algn="ctr">
+                      <a:solidFill>
+                        <a:srgbClr val="000000"/>
+                      </a:solidFill>
+                      <a:prstDash val="solid"/>
+                      <a:round/>
+                      <a:headEnd type="none" w="med" len="med"/>
+                      <a:tailEnd type="none" w="med" len="med"/>
+                    </a:lnL>
+                    <a:lnR w="6350" cap="flat" cmpd="sng" algn="ctr">
+                      <a:solidFill>
+                        <a:srgbClr val="000000"/>
+                      </a:solidFill>
+                      <a:prstDash val="solid"/>
+                      <a:round/>
+                      <a:headEnd type="none" w="med" len="med"/>
+                      <a:tailEnd type="none" w="med" len="med"/>
+                    </a:lnR>
+                    <a:lnT w="6350" cap="flat" cmpd="sng" algn="ctr">
+                      <a:solidFill>
+                        <a:srgbClr val="000000"/>
+                      </a:solidFill>
+                      <a:prstDash val="solid"/>
+                      <a:round/>
+                      <a:headEnd type="none" w="med" len="med"/>
+                      <a:tailEnd type="none" w="med" len="med"/>
+                    </a:lnT>
+                    <a:lnB w="6350" cap="flat" cmpd="sng" algn="ctr">
+                      <a:solidFill>
+                        <a:srgbClr val="000000"/>
+                      </a:solidFill>
+                      <a:prstDash val="solid"/>
+                      <a:round/>
+                      <a:headEnd type="none" w="med" len="med"/>
+                      <a:tailEnd type="none" w="med" len="med"/>
+                    </a:lnB>
+                  </a:tcPr>
+                </a:tc>
+                <a:extLst>
+                  <a:ext uri="{0D108BD9-81ED-4DB2-BD59-A6C34878D82A}">
+                    <a16:rowId xmlns:a16="http://schemas.microsoft.com/office/drawing/2014/main" val="707345180"/>
+                  </a:ext>
+                </a:extLst>
+              </a:tr>
+              <a:tr h="276219">
+                <a:tc>
+                  <a:txBody>
+                    <a:bodyPr/>
+                    <a:lstStyle/>
+                    <a:p>
+                      <a:pPr algn="l" fontAlgn="b"/>
+                      <a:r>
+                        <a:rPr lang="en-MY" sz="1600" b="0" i="0" u="none" strike="noStrike">
+                          <a:solidFill>
+                            <a:srgbClr val="000000"/>
+                          </a:solidFill>
+                          <a:effectLst/>
+                          <a:latin typeface="Arial" panose="020B0604020202020204" pitchFamily="34" charset="0"/>
+                          <a:cs typeface="Arial" panose="020B0604020202020204" pitchFamily="34" charset="0"/>
+                        </a:rPr>
+                        <a:t>P</a:t>
+                      </a:r>
+                    </a:p>
+                  </a:txBody>
+                  <a:tcPr marL="5620" marR="5620" marT="5620" marB="0" anchor="b">
+                    <a:lnL w="6350" cap="flat" cmpd="sng" algn="ctr">
+                      <a:solidFill>
+                        <a:srgbClr val="000000"/>
+                      </a:solidFill>
+                      <a:prstDash val="solid"/>
+                      <a:round/>
+                      <a:headEnd type="none" w="med" len="med"/>
+                      <a:tailEnd type="none" w="med" len="med"/>
+                    </a:lnL>
+                    <a:lnR w="6350" cap="flat" cmpd="sng" algn="ctr">
+                      <a:solidFill>
+                        <a:srgbClr val="000000"/>
+                      </a:solidFill>
+                      <a:prstDash val="solid"/>
+                      <a:round/>
+                      <a:headEnd type="none" w="med" len="med"/>
+                      <a:tailEnd type="none" w="med" len="med"/>
+                    </a:lnR>
+                    <a:lnT w="6350" cap="flat" cmpd="sng" algn="ctr">
+                      <a:solidFill>
+                        <a:srgbClr val="000000"/>
+                      </a:solidFill>
+                      <a:prstDash val="solid"/>
+                      <a:round/>
+                      <a:headEnd type="none" w="med" len="med"/>
+                      <a:tailEnd type="none" w="med" len="med"/>
+                    </a:lnT>
+                    <a:lnB w="6350" cap="flat" cmpd="sng" algn="ctr">
+                      <a:solidFill>
+                        <a:srgbClr val="000000"/>
+                      </a:solidFill>
+                      <a:prstDash val="solid"/>
+                      <a:round/>
+                      <a:headEnd type="none" w="med" len="med"/>
+                      <a:tailEnd type="none" w="med" len="med"/>
+                    </a:lnB>
+                  </a:tcPr>
+                </a:tc>
+                <a:tc>
+                  <a:txBody>
+                    <a:bodyPr/>
+                    <a:lstStyle/>
+                    <a:p>
+                      <a:pPr algn="l" fontAlgn="b"/>
+                      <a:r>
+                        <a:rPr lang="en-MY" sz="1600" b="0" i="0" u="none" strike="noStrike" dirty="0" err="1">
+                          <a:solidFill>
+                            <a:srgbClr val="000000"/>
+                          </a:solidFill>
+                          <a:effectLst/>
+                          <a:latin typeface="Arial" panose="020B0604020202020204" pitchFamily="34" charset="0"/>
+                          <a:cs typeface="Arial" panose="020B0604020202020204" pitchFamily="34" charset="0"/>
+                        </a:rPr>
+                        <a:t>PtoC_ratio</a:t>
+                      </a:r>
+                      <a:endParaRPr lang="en-MY" sz="1600" b="0" i="0" u="none" strike="noStrike" dirty="0">
+                        <a:solidFill>
+                          <a:srgbClr val="000000"/>
+                        </a:solidFill>
+                        <a:effectLst/>
+                        <a:latin typeface="Arial" panose="020B0604020202020204" pitchFamily="34" charset="0"/>
+                        <a:cs typeface="Arial" panose="020B0604020202020204" pitchFamily="34" charset="0"/>
+                      </a:endParaRPr>
+                    </a:p>
+                  </a:txBody>
+                  <a:tcPr marL="5620" marR="5620" marT="5620" marB="0" anchor="b">
+                    <a:lnL w="6350" cap="flat" cmpd="sng" algn="ctr">
+                      <a:solidFill>
+                        <a:srgbClr val="000000"/>
+                      </a:solidFill>
+                      <a:prstDash val="solid"/>
+                      <a:round/>
+                      <a:headEnd type="none" w="med" len="med"/>
+                      <a:tailEnd type="none" w="med" len="med"/>
+                    </a:lnL>
+                    <a:lnR w="6350" cap="flat" cmpd="sng" algn="ctr">
+                      <a:solidFill>
+                        <a:srgbClr val="000000"/>
+                      </a:solidFill>
+                      <a:prstDash val="solid"/>
+                      <a:round/>
+                      <a:headEnd type="none" w="med" len="med"/>
+                      <a:tailEnd type="none" w="med" len="med"/>
+                    </a:lnR>
+                    <a:lnT w="6350" cap="flat" cmpd="sng" algn="ctr">
+                      <a:solidFill>
+                        <a:srgbClr val="000000"/>
+                      </a:solidFill>
+                      <a:prstDash val="solid"/>
+                      <a:round/>
+                      <a:headEnd type="none" w="med" len="med"/>
+                      <a:tailEnd type="none" w="med" len="med"/>
+                    </a:lnT>
+                    <a:lnB w="6350" cap="flat" cmpd="sng" algn="ctr">
+                      <a:solidFill>
+                        <a:srgbClr val="000000"/>
+                      </a:solidFill>
+                      <a:prstDash val="solid"/>
+                      <a:round/>
+                      <a:headEnd type="none" w="med" len="med"/>
+                      <a:tailEnd type="none" w="med" len="med"/>
+                    </a:lnB>
+                  </a:tcPr>
+                </a:tc>
+                <a:extLst>
+                  <a:ext uri="{0D108BD9-81ED-4DB2-BD59-A6C34878D82A}">
+                    <a16:rowId xmlns:a16="http://schemas.microsoft.com/office/drawing/2014/main" val="3101295399"/>
+                  </a:ext>
+                </a:extLst>
+              </a:tr>
+              <a:tr h="276219">
+                <a:tc>
+                  <a:txBody>
+                    <a:bodyPr/>
+                    <a:lstStyle/>
+                    <a:p>
+                      <a:pPr algn="l" fontAlgn="b"/>
+                      <a:r>
+                        <a:rPr lang="en-MY" sz="1600" b="0" i="0" u="none" strike="noStrike">
+                          <a:solidFill>
+                            <a:srgbClr val="000000"/>
+                          </a:solidFill>
+                          <a:effectLst/>
+                          <a:latin typeface="Arial" panose="020B0604020202020204" pitchFamily="34" charset="0"/>
+                          <a:cs typeface="Arial" panose="020B0604020202020204" pitchFamily="34" charset="0"/>
+                        </a:rPr>
+                        <a:t>Na</a:t>
+                      </a:r>
+                    </a:p>
+                  </a:txBody>
+                  <a:tcPr marL="5620" marR="5620" marT="5620" marB="0" anchor="b">
+                    <a:lnL w="6350" cap="flat" cmpd="sng" algn="ctr">
+                      <a:solidFill>
+                        <a:srgbClr val="000000"/>
+                      </a:solidFill>
+                      <a:prstDash val="solid"/>
+                      <a:round/>
+                      <a:headEnd type="none" w="med" len="med"/>
+                      <a:tailEnd type="none" w="med" len="med"/>
+                    </a:lnL>
+                    <a:lnR w="6350" cap="flat" cmpd="sng" algn="ctr">
+                      <a:solidFill>
+                        <a:srgbClr val="000000"/>
+                      </a:solidFill>
+                      <a:prstDash val="solid"/>
+                      <a:round/>
+                      <a:headEnd type="none" w="med" len="med"/>
+                      <a:tailEnd type="none" w="med" len="med"/>
+                    </a:lnR>
+                    <a:lnT w="6350" cap="flat" cmpd="sng" algn="ctr">
+                      <a:solidFill>
+                        <a:srgbClr val="000000"/>
+                      </a:solidFill>
+                      <a:prstDash val="solid"/>
+                      <a:round/>
+                      <a:headEnd type="none" w="med" len="med"/>
+                      <a:tailEnd type="none" w="med" len="med"/>
+                    </a:lnT>
+                    <a:lnB w="6350" cap="flat" cmpd="sng" algn="ctr">
+                      <a:solidFill>
+                        <a:srgbClr val="000000"/>
+                      </a:solidFill>
+                      <a:prstDash val="solid"/>
+                      <a:round/>
+                      <a:headEnd type="none" w="med" len="med"/>
+                      <a:tailEnd type="none" w="med" len="med"/>
+                    </a:lnB>
+                  </a:tcPr>
+                </a:tc>
+                <a:tc>
+                  <a:txBody>
+                    <a:bodyPr/>
+                    <a:lstStyle/>
+                    <a:p>
+                      <a:pPr algn="l" fontAlgn="b"/>
+                      <a:r>
+                        <a:rPr lang="en-MY" sz="1600" b="0" i="0" u="none" strike="noStrike" dirty="0" err="1">
+                          <a:solidFill>
+                            <a:srgbClr val="000000"/>
+                          </a:solidFill>
+                          <a:effectLst/>
+                          <a:latin typeface="Arial" panose="020B0604020202020204" pitchFamily="34" charset="0"/>
+                          <a:cs typeface="Arial" panose="020B0604020202020204" pitchFamily="34" charset="0"/>
+                        </a:rPr>
+                        <a:t>NtoP_ratio</a:t>
+                      </a:r>
+                      <a:endParaRPr lang="en-MY" sz="1600" b="0" i="0" u="none" strike="noStrike" dirty="0">
+                        <a:solidFill>
+                          <a:srgbClr val="000000"/>
+                        </a:solidFill>
+                        <a:effectLst/>
+                        <a:latin typeface="Arial" panose="020B0604020202020204" pitchFamily="34" charset="0"/>
+                        <a:cs typeface="Arial" panose="020B0604020202020204" pitchFamily="34" charset="0"/>
+                      </a:endParaRPr>
+                    </a:p>
+                  </a:txBody>
+                  <a:tcPr marL="5620" marR="5620" marT="5620" marB="0" anchor="b">
+                    <a:lnL w="6350" cap="flat" cmpd="sng" algn="ctr">
+                      <a:solidFill>
+                        <a:srgbClr val="000000"/>
+                      </a:solidFill>
+                      <a:prstDash val="solid"/>
+                      <a:round/>
+                      <a:headEnd type="none" w="med" len="med"/>
+                      <a:tailEnd type="none" w="med" len="med"/>
+                    </a:lnL>
+                    <a:lnR w="6350" cap="flat" cmpd="sng" algn="ctr">
+                      <a:solidFill>
+                        <a:srgbClr val="000000"/>
+                      </a:solidFill>
+                      <a:prstDash val="solid"/>
+                      <a:round/>
+                      <a:headEnd type="none" w="med" len="med"/>
+                      <a:tailEnd type="none" w="med" len="med"/>
+                    </a:lnR>
+                    <a:lnT w="6350" cap="flat" cmpd="sng" algn="ctr">
+                      <a:solidFill>
+                        <a:srgbClr val="000000"/>
+                      </a:solidFill>
+                      <a:prstDash val="solid"/>
+                      <a:round/>
+                      <a:headEnd type="none" w="med" len="med"/>
+                      <a:tailEnd type="none" w="med" len="med"/>
+                    </a:lnT>
+                    <a:lnB w="6350" cap="flat" cmpd="sng" algn="ctr">
+                      <a:solidFill>
+                        <a:srgbClr val="000000"/>
+                      </a:solidFill>
+                      <a:prstDash val="solid"/>
+                      <a:round/>
+                      <a:headEnd type="none" w="med" len="med"/>
+                      <a:tailEnd type="none" w="med" len="med"/>
+                    </a:lnB>
+                  </a:tcPr>
+                </a:tc>
+                <a:extLst>
+                  <a:ext uri="{0D108BD9-81ED-4DB2-BD59-A6C34878D82A}">
+                    <a16:rowId xmlns:a16="http://schemas.microsoft.com/office/drawing/2014/main" val="3671018778"/>
+                  </a:ext>
+                </a:extLst>
+              </a:tr>
+              <a:tr h="227878">
+                <a:tc>
+                  <a:txBody>
+                    <a:bodyPr/>
+                    <a:lstStyle/>
+                    <a:p>
+                      <a:pPr algn="l" fontAlgn="b"/>
+                      <a:r>
+                        <a:rPr lang="en-MY" sz="1600" b="0" i="0" u="none" strike="noStrike">
+                          <a:solidFill>
+                            <a:srgbClr val="000000"/>
+                          </a:solidFill>
+                          <a:effectLst/>
+                          <a:latin typeface="Arial" panose="020B0604020202020204" pitchFamily="34" charset="0"/>
+                          <a:cs typeface="Arial" panose="020B0604020202020204" pitchFamily="34" charset="0"/>
+                        </a:rPr>
+                        <a:t>El_comp</a:t>
+                      </a:r>
+                    </a:p>
+                  </a:txBody>
+                  <a:tcPr marL="5620" marR="5620" marT="5620" marB="0" anchor="b">
+                    <a:lnL w="6350" cap="flat" cmpd="sng" algn="ctr">
+                      <a:solidFill>
+                        <a:srgbClr val="000000"/>
+                      </a:solidFill>
+                      <a:prstDash val="solid"/>
+                      <a:round/>
+                      <a:headEnd type="none" w="med" len="med"/>
+                      <a:tailEnd type="none" w="med" len="med"/>
+                    </a:lnL>
+                    <a:lnR w="6350" cap="flat" cmpd="sng" algn="ctr">
+                      <a:solidFill>
+                        <a:srgbClr val="000000"/>
+                      </a:solidFill>
+                      <a:prstDash val="solid"/>
+                      <a:round/>
+                      <a:headEnd type="none" w="med" len="med"/>
+                      <a:tailEnd type="none" w="med" len="med"/>
+                    </a:lnR>
+                    <a:lnT w="6350" cap="flat" cmpd="sng" algn="ctr">
+                      <a:solidFill>
+                        <a:srgbClr val="000000"/>
+                      </a:solidFill>
+                      <a:prstDash val="solid"/>
+                      <a:round/>
+                      <a:headEnd type="none" w="med" len="med"/>
+                      <a:tailEnd type="none" w="med" len="med"/>
+                    </a:lnT>
+                    <a:lnB w="6350" cap="flat" cmpd="sng" algn="ctr">
+                      <a:solidFill>
+                        <a:srgbClr val="000000"/>
+                      </a:solidFill>
+                      <a:prstDash val="solid"/>
+                      <a:round/>
+                      <a:headEnd type="none" w="med" len="med"/>
+                      <a:tailEnd type="none" w="med" len="med"/>
+                    </a:lnB>
+                  </a:tcPr>
+                </a:tc>
+                <a:tc>
+                  <a:txBody>
+                    <a:bodyPr/>
+                    <a:lstStyle/>
+                    <a:p>
+                      <a:pPr algn="l" fontAlgn="b"/>
+                      <a:r>
+                        <a:rPr lang="en-MY" sz="1600" b="0" i="0" u="none" strike="noStrike" dirty="0">
+                          <a:solidFill>
+                            <a:srgbClr val="000000"/>
+                          </a:solidFill>
+                          <a:effectLst/>
+                          <a:latin typeface="Arial" panose="020B0604020202020204" pitchFamily="34" charset="0"/>
+                          <a:cs typeface="Arial" panose="020B0604020202020204" pitchFamily="34" charset="0"/>
+                        </a:rPr>
+                        <a:t>bs1_class</a:t>
+                      </a:r>
+                    </a:p>
+                  </a:txBody>
+                  <a:tcPr marL="5620" marR="5620" marT="5620" marB="0" anchor="b">
+                    <a:lnL w="6350" cap="flat" cmpd="sng" algn="ctr">
+                      <a:solidFill>
+                        <a:srgbClr val="000000"/>
+                      </a:solidFill>
+                      <a:prstDash val="solid"/>
+                      <a:round/>
+                      <a:headEnd type="none" w="med" len="med"/>
+                      <a:tailEnd type="none" w="med" len="med"/>
+                    </a:lnL>
+                    <a:lnR w="6350" cap="flat" cmpd="sng" algn="ctr">
+                      <a:solidFill>
+                        <a:srgbClr val="000000"/>
+                      </a:solidFill>
+                      <a:prstDash val="solid"/>
+                      <a:round/>
+                      <a:headEnd type="none" w="med" len="med"/>
+                      <a:tailEnd type="none" w="med" len="med"/>
+                    </a:lnR>
+                    <a:lnT w="6350" cap="flat" cmpd="sng" algn="ctr">
+                      <a:solidFill>
+                        <a:srgbClr val="000000"/>
+                      </a:solidFill>
+                      <a:prstDash val="solid"/>
+                      <a:round/>
+                      <a:headEnd type="none" w="med" len="med"/>
+                      <a:tailEnd type="none" w="med" len="med"/>
+                    </a:lnT>
+                    <a:lnB w="6350" cap="flat" cmpd="sng" algn="ctr">
+                      <a:solidFill>
+                        <a:srgbClr val="000000"/>
+                      </a:solidFill>
+                      <a:prstDash val="solid"/>
+                      <a:round/>
+                      <a:headEnd type="none" w="med" len="med"/>
+                      <a:tailEnd type="none" w="med" len="med"/>
+                    </a:lnB>
+                  </a:tcPr>
+                </a:tc>
+                <a:extLst>
+                  <a:ext uri="{0D108BD9-81ED-4DB2-BD59-A6C34878D82A}">
+                    <a16:rowId xmlns:a16="http://schemas.microsoft.com/office/drawing/2014/main" val="2404869536"/>
+                  </a:ext>
+                </a:extLst>
+              </a:tr>
+              <a:tr h="227878">
+                <a:tc>
+                  <a:txBody>
+                    <a:bodyPr/>
+                    <a:lstStyle/>
+                    <a:p>
+                      <a:pPr algn="l" fontAlgn="b"/>
+                      <a:r>
+                        <a:rPr lang="en-MY" sz="1600" b="0" i="0" u="none" strike="noStrike">
+                          <a:solidFill>
+                            <a:srgbClr val="000000"/>
+                          </a:solidFill>
+                          <a:effectLst/>
+                          <a:latin typeface="Arial" panose="020B0604020202020204" pitchFamily="34" charset="0"/>
+                          <a:cs typeface="Arial" panose="020B0604020202020204" pitchFamily="34" charset="0"/>
+                        </a:rPr>
+                        <a:t>Class</a:t>
+                      </a:r>
+                    </a:p>
+                  </a:txBody>
+                  <a:tcPr marL="5620" marR="5620" marT="5620" marB="0" anchor="b">
+                    <a:lnL w="6350" cap="flat" cmpd="sng" algn="ctr">
+                      <a:solidFill>
+                        <a:srgbClr val="000000"/>
+                      </a:solidFill>
+                      <a:prstDash val="solid"/>
+                      <a:round/>
+                      <a:headEnd type="none" w="med" len="med"/>
+                      <a:tailEnd type="none" w="med" len="med"/>
+                    </a:lnL>
+                    <a:lnR w="6350" cap="flat" cmpd="sng" algn="ctr">
+                      <a:solidFill>
+                        <a:srgbClr val="000000"/>
+                      </a:solidFill>
+                      <a:prstDash val="solid"/>
+                      <a:round/>
+                      <a:headEnd type="none" w="med" len="med"/>
+                      <a:tailEnd type="none" w="med" len="med"/>
+                    </a:lnR>
+                    <a:lnT w="6350" cap="flat" cmpd="sng" algn="ctr">
+                      <a:solidFill>
+                        <a:srgbClr val="000000"/>
+                      </a:solidFill>
+                      <a:prstDash val="solid"/>
+                      <a:round/>
+                      <a:headEnd type="none" w="med" len="med"/>
+                      <a:tailEnd type="none" w="med" len="med"/>
+                    </a:lnT>
+                    <a:lnB w="6350" cap="flat" cmpd="sng" algn="ctr">
+                      <a:solidFill>
+                        <a:srgbClr val="000000"/>
+                      </a:solidFill>
+                      <a:prstDash val="solid"/>
+                      <a:round/>
+                      <a:headEnd type="none" w="med" len="med"/>
+                      <a:tailEnd type="none" w="med" len="med"/>
+                    </a:lnB>
+                  </a:tcPr>
+                </a:tc>
+                <a:tc>
+                  <a:txBody>
+                    <a:bodyPr/>
+                    <a:lstStyle/>
+                    <a:p>
+                      <a:pPr algn="l" fontAlgn="b"/>
+                      <a:r>
+                        <a:rPr lang="en-MY" sz="1600" b="0" i="0" u="none" strike="noStrike" dirty="0">
+                          <a:solidFill>
+                            <a:srgbClr val="000000"/>
+                          </a:solidFill>
+                          <a:effectLst/>
+                          <a:latin typeface="Arial" panose="020B0604020202020204" pitchFamily="34" charset="0"/>
+                          <a:cs typeface="Arial" panose="020B0604020202020204" pitchFamily="34" charset="0"/>
+                        </a:rPr>
+                        <a:t>bs2_class</a:t>
+                      </a:r>
+                    </a:p>
+                  </a:txBody>
+                  <a:tcPr marL="5620" marR="5620" marT="5620" marB="0" anchor="b">
+                    <a:lnL w="6350" cap="flat" cmpd="sng" algn="ctr">
+                      <a:solidFill>
+                        <a:srgbClr val="000000"/>
+                      </a:solidFill>
+                      <a:prstDash val="solid"/>
+                      <a:round/>
+                      <a:headEnd type="none" w="med" len="med"/>
+                      <a:tailEnd type="none" w="med" len="med"/>
+                    </a:lnL>
+                    <a:lnR w="6350" cap="flat" cmpd="sng" algn="ctr">
+                      <a:solidFill>
+                        <a:srgbClr val="000000"/>
+                      </a:solidFill>
+                      <a:prstDash val="solid"/>
+                      <a:round/>
+                      <a:headEnd type="none" w="med" len="med"/>
+                      <a:tailEnd type="none" w="med" len="med"/>
+                    </a:lnR>
+                    <a:lnT w="6350" cap="flat" cmpd="sng" algn="ctr">
+                      <a:solidFill>
+                        <a:srgbClr val="000000"/>
+                      </a:solidFill>
+                      <a:prstDash val="solid"/>
+                      <a:round/>
+                      <a:headEnd type="none" w="med" len="med"/>
+                      <a:tailEnd type="none" w="med" len="med"/>
+                    </a:lnT>
+                    <a:lnB w="6350" cap="flat" cmpd="sng" algn="ctr">
+                      <a:solidFill>
+                        <a:srgbClr val="000000"/>
+                      </a:solidFill>
+                      <a:prstDash val="solid"/>
+                      <a:round/>
+                      <a:headEnd type="none" w="med" len="med"/>
+                      <a:tailEnd type="none" w="med" len="med"/>
+                    </a:lnB>
+                  </a:tcPr>
+                </a:tc>
+                <a:extLst>
+                  <a:ext uri="{0D108BD9-81ED-4DB2-BD59-A6C34878D82A}">
+                    <a16:rowId xmlns:a16="http://schemas.microsoft.com/office/drawing/2014/main" val="2543253507"/>
+                  </a:ext>
+                </a:extLst>
+              </a:tr>
+              <a:tr h="227878">
+                <a:tc>
+                  <a:txBody>
+                    <a:bodyPr/>
+                    <a:lstStyle/>
+                    <a:p>
+                      <a:pPr algn="l" fontAlgn="b"/>
+                      <a:r>
+                        <a:rPr lang="en-MY" sz="1600" b="0" i="0" u="none" strike="noStrike">
+                          <a:solidFill>
+                            <a:srgbClr val="000000"/>
+                          </a:solidFill>
+                          <a:effectLst/>
+                          <a:latin typeface="Arial" panose="020B0604020202020204" pitchFamily="34" charset="0"/>
+                          <a:cs typeface="Arial" panose="020B0604020202020204" pitchFamily="34" charset="0"/>
+                        </a:rPr>
+                        <a:t>NeutralMass</a:t>
+                      </a:r>
+                    </a:p>
+                  </a:txBody>
+                  <a:tcPr marL="5620" marR="5620" marT="5620" marB="0" anchor="b">
+                    <a:lnL w="6350" cap="flat" cmpd="sng" algn="ctr">
+                      <a:solidFill>
+                        <a:srgbClr val="000000"/>
+                      </a:solidFill>
+                      <a:prstDash val="solid"/>
+                      <a:round/>
+                      <a:headEnd type="none" w="med" len="med"/>
+                      <a:tailEnd type="none" w="med" len="med"/>
+                    </a:lnL>
+                    <a:lnR w="6350" cap="flat" cmpd="sng" algn="ctr">
+                      <a:solidFill>
+                        <a:srgbClr val="000000"/>
+                      </a:solidFill>
+                      <a:prstDash val="solid"/>
+                      <a:round/>
+                      <a:headEnd type="none" w="med" len="med"/>
+                      <a:tailEnd type="none" w="med" len="med"/>
+                    </a:lnR>
+                    <a:lnT w="6350" cap="flat" cmpd="sng" algn="ctr">
+                      <a:solidFill>
+                        <a:srgbClr val="000000"/>
+                      </a:solidFill>
+                      <a:prstDash val="solid"/>
+                      <a:round/>
+                      <a:headEnd type="none" w="med" len="med"/>
+                      <a:tailEnd type="none" w="med" len="med"/>
+                    </a:lnT>
+                    <a:lnB w="6350" cap="flat" cmpd="sng" algn="ctr">
+                      <a:solidFill>
+                        <a:srgbClr val="000000"/>
+                      </a:solidFill>
+                      <a:prstDash val="solid"/>
+                      <a:round/>
+                      <a:headEnd type="none" w="med" len="med"/>
+                      <a:tailEnd type="none" w="med" len="med"/>
+                    </a:lnB>
+                  </a:tcPr>
+                </a:tc>
+                <a:tc>
+                  <a:txBody>
+                    <a:bodyPr/>
+                    <a:lstStyle/>
+                    <a:p>
+                      <a:pPr algn="l" fontAlgn="b"/>
+                      <a:r>
+                        <a:rPr lang="en-MY" sz="1600" b="0" i="0" u="none" strike="noStrike" dirty="0">
+                          <a:solidFill>
+                            <a:srgbClr val="000000"/>
+                          </a:solidFill>
+                          <a:effectLst/>
+                          <a:latin typeface="Arial" panose="020B0604020202020204" pitchFamily="34" charset="0"/>
+                          <a:cs typeface="Arial" panose="020B0604020202020204" pitchFamily="34" charset="0"/>
+                        </a:rPr>
+                        <a:t>bs3_class</a:t>
+                      </a:r>
+                    </a:p>
+                  </a:txBody>
+                  <a:tcPr marL="5620" marR="5620" marT="5620" marB="0" anchor="b">
+                    <a:lnL w="6350" cap="flat" cmpd="sng" algn="ctr">
+                      <a:solidFill>
+                        <a:srgbClr val="000000"/>
+                      </a:solidFill>
+                      <a:prstDash val="solid"/>
+                      <a:round/>
+                      <a:headEnd type="none" w="med" len="med"/>
+                      <a:tailEnd type="none" w="med" len="med"/>
+                    </a:lnL>
+                    <a:lnR w="6350" cap="flat" cmpd="sng" algn="ctr">
+                      <a:solidFill>
+                        <a:srgbClr val="000000"/>
+                      </a:solidFill>
+                      <a:prstDash val="solid"/>
+                      <a:round/>
+                      <a:headEnd type="none" w="med" len="med"/>
+                      <a:tailEnd type="none" w="med" len="med"/>
+                    </a:lnR>
+                    <a:lnT w="6350" cap="flat" cmpd="sng" algn="ctr">
+                      <a:solidFill>
+                        <a:srgbClr val="000000"/>
+                      </a:solidFill>
+                      <a:prstDash val="solid"/>
+                      <a:round/>
+                      <a:headEnd type="none" w="med" len="med"/>
+                      <a:tailEnd type="none" w="med" len="med"/>
+                    </a:lnT>
+                    <a:lnB w="6350" cap="flat" cmpd="sng" algn="ctr">
+                      <a:solidFill>
+                        <a:srgbClr val="000000"/>
+                      </a:solidFill>
+                      <a:prstDash val="solid"/>
+                      <a:round/>
+                      <a:headEnd type="none" w="med" len="med"/>
+                      <a:tailEnd type="none" w="med" len="med"/>
+                    </a:lnB>
+                  </a:tcPr>
+                </a:tc>
+                <a:extLst>
+                  <a:ext uri="{0D108BD9-81ED-4DB2-BD59-A6C34878D82A}">
+                    <a16:rowId xmlns:a16="http://schemas.microsoft.com/office/drawing/2014/main" val="2158842334"/>
+                  </a:ext>
+                </a:extLst>
+              </a:tr>
+              <a:tr h="276219">
+                <a:tc>
+                  <a:txBody>
+                    <a:bodyPr/>
+                    <a:lstStyle/>
+                    <a:p>
+                      <a:pPr algn="l" fontAlgn="b"/>
+                      <a:r>
+                        <a:rPr lang="en-MY" sz="1600" b="0" i="0" u="none" strike="noStrike">
+                          <a:solidFill>
+                            <a:srgbClr val="000000"/>
+                          </a:solidFill>
+                          <a:effectLst/>
+                          <a:latin typeface="Arial" panose="020B0604020202020204" pitchFamily="34" charset="0"/>
+                          <a:cs typeface="Arial" panose="020B0604020202020204" pitchFamily="34" charset="0"/>
+                        </a:rPr>
+                        <a:t>Error_ppm</a:t>
+                      </a:r>
+                    </a:p>
+                  </a:txBody>
+                  <a:tcPr marL="5620" marR="5620" marT="5620" marB="0" anchor="b">
+                    <a:lnL w="6350" cap="flat" cmpd="sng" algn="ctr">
+                      <a:solidFill>
+                        <a:srgbClr val="000000"/>
+                      </a:solidFill>
+                      <a:prstDash val="solid"/>
+                      <a:round/>
+                      <a:headEnd type="none" w="med" len="med"/>
+                      <a:tailEnd type="none" w="med" len="med"/>
+                    </a:lnL>
+                    <a:lnR w="6350" cap="flat" cmpd="sng" algn="ctr">
+                      <a:solidFill>
+                        <a:srgbClr val="000000"/>
+                      </a:solidFill>
+                      <a:prstDash val="solid"/>
+                      <a:round/>
+                      <a:headEnd type="none" w="med" len="med"/>
+                      <a:tailEnd type="none" w="med" len="med"/>
+                    </a:lnR>
+                    <a:lnT w="6350" cap="flat" cmpd="sng" algn="ctr">
+                      <a:solidFill>
+                        <a:srgbClr val="000000"/>
+                      </a:solidFill>
+                      <a:prstDash val="solid"/>
+                      <a:round/>
+                      <a:headEnd type="none" w="med" len="med"/>
+                      <a:tailEnd type="none" w="med" len="med"/>
+                    </a:lnT>
+                    <a:lnB w="6350" cap="flat" cmpd="sng" algn="ctr">
+                      <a:solidFill>
+                        <a:srgbClr val="000000"/>
+                      </a:solidFill>
+                      <a:prstDash val="solid"/>
+                      <a:round/>
+                      <a:headEnd type="none" w="med" len="med"/>
+                      <a:tailEnd type="none" w="med" len="med"/>
+                    </a:lnB>
+                  </a:tcPr>
+                </a:tc>
+                <a:tc>
+                  <a:txBody>
+                    <a:bodyPr/>
+                    <a:lstStyle/>
+                    <a:p>
+                      <a:pPr algn="l" fontAlgn="b"/>
+                      <a:r>
+                        <a:rPr lang="en-MY" sz="1600" b="0" i="0" u="none" strike="noStrike" dirty="0">
+                          <a:solidFill>
+                            <a:srgbClr val="000000"/>
+                          </a:solidFill>
+                          <a:effectLst/>
+                          <a:latin typeface="Arial" panose="020B0604020202020204" pitchFamily="34" charset="0"/>
+                          <a:cs typeface="Arial" panose="020B0604020202020204" pitchFamily="34" charset="0"/>
+                        </a:rPr>
+                        <a:t>delGcox0PerCmol</a:t>
+                      </a:r>
+                    </a:p>
+                  </a:txBody>
+                  <a:tcPr marL="5620" marR="5620" marT="5620" marB="0" anchor="b">
+                    <a:lnL w="6350" cap="flat" cmpd="sng" algn="ctr">
+                      <a:solidFill>
+                        <a:srgbClr val="000000"/>
+                      </a:solidFill>
+                      <a:prstDash val="solid"/>
+                      <a:round/>
+                      <a:headEnd type="none" w="med" len="med"/>
+                      <a:tailEnd type="none" w="med" len="med"/>
+                    </a:lnL>
+                    <a:lnR w="6350" cap="flat" cmpd="sng" algn="ctr">
+                      <a:solidFill>
+                        <a:srgbClr val="000000"/>
+                      </a:solidFill>
+                      <a:prstDash val="solid"/>
+                      <a:round/>
+                      <a:headEnd type="none" w="med" len="med"/>
+                      <a:tailEnd type="none" w="med" len="med"/>
+                    </a:lnR>
+                    <a:lnT w="6350" cap="flat" cmpd="sng" algn="ctr">
+                      <a:solidFill>
+                        <a:srgbClr val="000000"/>
+                      </a:solidFill>
+                      <a:prstDash val="solid"/>
+                      <a:round/>
+                      <a:headEnd type="none" w="med" len="med"/>
+                      <a:tailEnd type="none" w="med" len="med"/>
+                    </a:lnT>
+                    <a:lnB w="6350" cap="flat" cmpd="sng" algn="ctr">
+                      <a:solidFill>
+                        <a:srgbClr val="000000"/>
+                      </a:solidFill>
+                      <a:prstDash val="solid"/>
+                      <a:round/>
+                      <a:headEnd type="none" w="med" len="med"/>
+                      <a:tailEnd type="none" w="med" len="med"/>
+                    </a:lnB>
+                  </a:tcPr>
+                </a:tc>
+                <a:extLst>
+                  <a:ext uri="{0D108BD9-81ED-4DB2-BD59-A6C34878D82A}">
+                    <a16:rowId xmlns:a16="http://schemas.microsoft.com/office/drawing/2014/main" val="1891161281"/>
+                  </a:ext>
+                </a:extLst>
+              </a:tr>
+              <a:tr h="276219">
+                <a:tc>
+                  <a:txBody>
+                    <a:bodyPr/>
+                    <a:lstStyle/>
+                    <a:p>
+                      <a:pPr algn="l" fontAlgn="b"/>
+                      <a:r>
+                        <a:rPr lang="en-MY" sz="1600" b="0" i="0" u="none" strike="noStrike">
+                          <a:solidFill>
+                            <a:srgbClr val="000000"/>
+                          </a:solidFill>
+                          <a:effectLst/>
+                          <a:latin typeface="Arial" panose="020B0604020202020204" pitchFamily="34" charset="0"/>
+                          <a:cs typeface="Arial" panose="020B0604020202020204" pitchFamily="34" charset="0"/>
+                        </a:rPr>
+                        <a:t>Candidates</a:t>
+                      </a:r>
+                    </a:p>
+                  </a:txBody>
+                  <a:tcPr marL="5620" marR="5620" marT="5620" marB="0" anchor="b">
+                    <a:lnL w="6350" cap="flat" cmpd="sng" algn="ctr">
+                      <a:solidFill>
+                        <a:srgbClr val="000000"/>
+                      </a:solidFill>
+                      <a:prstDash val="solid"/>
+                      <a:round/>
+                      <a:headEnd type="none" w="med" len="med"/>
+                      <a:tailEnd type="none" w="med" len="med"/>
+                    </a:lnL>
+                    <a:lnR w="6350" cap="flat" cmpd="sng" algn="ctr">
+                      <a:solidFill>
+                        <a:srgbClr val="000000"/>
+                      </a:solidFill>
+                      <a:prstDash val="solid"/>
+                      <a:round/>
+                      <a:headEnd type="none" w="med" len="med"/>
+                      <a:tailEnd type="none" w="med" len="med"/>
+                    </a:lnR>
+                    <a:lnT w="6350" cap="flat" cmpd="sng" algn="ctr">
+                      <a:solidFill>
+                        <a:srgbClr val="000000"/>
+                      </a:solidFill>
+                      <a:prstDash val="solid"/>
+                      <a:round/>
+                      <a:headEnd type="none" w="med" len="med"/>
+                      <a:tailEnd type="none" w="med" len="med"/>
+                    </a:lnT>
+                    <a:lnB w="6350" cap="flat" cmpd="sng" algn="ctr">
+                      <a:solidFill>
+                        <a:srgbClr val="000000"/>
+                      </a:solidFill>
+                      <a:prstDash val="solid"/>
+                      <a:round/>
+                      <a:headEnd type="none" w="med" len="med"/>
+                      <a:tailEnd type="none" w="med" len="med"/>
+                    </a:lnB>
+                  </a:tcPr>
+                </a:tc>
+                <a:tc>
+                  <a:txBody>
+                    <a:bodyPr/>
+                    <a:lstStyle/>
+                    <a:p>
+                      <a:pPr algn="l" fontAlgn="b"/>
+                      <a:r>
+                        <a:rPr lang="en-MY" sz="1600" b="0" i="0" u="none" strike="noStrike" dirty="0" err="1">
+                          <a:solidFill>
+                            <a:srgbClr val="000000"/>
+                          </a:solidFill>
+                          <a:effectLst/>
+                          <a:latin typeface="Arial" panose="020B0604020202020204" pitchFamily="34" charset="0"/>
+                          <a:cs typeface="Arial" panose="020B0604020202020204" pitchFamily="34" charset="0"/>
+                        </a:rPr>
+                        <a:t>delGcoxPerCmol</a:t>
+                      </a:r>
+                      <a:endParaRPr lang="en-MY" sz="1600" b="0" i="0" u="none" strike="noStrike" dirty="0">
+                        <a:solidFill>
+                          <a:srgbClr val="000000"/>
+                        </a:solidFill>
+                        <a:effectLst/>
+                        <a:latin typeface="Arial" panose="020B0604020202020204" pitchFamily="34" charset="0"/>
+                        <a:cs typeface="Arial" panose="020B0604020202020204" pitchFamily="34" charset="0"/>
+                      </a:endParaRPr>
+                    </a:p>
+                  </a:txBody>
+                  <a:tcPr marL="5620" marR="5620" marT="5620" marB="0" anchor="b">
+                    <a:lnL w="6350" cap="flat" cmpd="sng" algn="ctr">
+                      <a:solidFill>
+                        <a:srgbClr val="000000"/>
+                      </a:solidFill>
+                      <a:prstDash val="solid"/>
+                      <a:round/>
+                      <a:headEnd type="none" w="med" len="med"/>
+                      <a:tailEnd type="none" w="med" len="med"/>
+                    </a:lnL>
+                    <a:lnR w="6350" cap="flat" cmpd="sng" algn="ctr">
+                      <a:solidFill>
+                        <a:srgbClr val="000000"/>
+                      </a:solidFill>
+                      <a:prstDash val="solid"/>
+                      <a:round/>
+                      <a:headEnd type="none" w="med" len="med"/>
+                      <a:tailEnd type="none" w="med" len="med"/>
+                    </a:lnR>
+                    <a:lnT w="6350" cap="flat" cmpd="sng" algn="ctr">
+                      <a:solidFill>
+                        <a:srgbClr val="000000"/>
+                      </a:solidFill>
+                      <a:prstDash val="solid"/>
+                      <a:round/>
+                      <a:headEnd type="none" w="med" len="med"/>
+                      <a:tailEnd type="none" w="med" len="med"/>
+                    </a:lnT>
+                    <a:lnB w="6350" cap="flat" cmpd="sng" algn="ctr">
+                      <a:solidFill>
+                        <a:srgbClr val="000000"/>
+                      </a:solidFill>
+                      <a:prstDash val="solid"/>
+                      <a:round/>
+                      <a:headEnd type="none" w="med" len="med"/>
+                      <a:tailEnd type="none" w="med" len="med"/>
+                    </a:lnB>
+                  </a:tcPr>
+                </a:tc>
+                <a:extLst>
+                  <a:ext uri="{0D108BD9-81ED-4DB2-BD59-A6C34878D82A}">
+                    <a16:rowId xmlns:a16="http://schemas.microsoft.com/office/drawing/2014/main" val="3559862880"/>
+                  </a:ext>
+                </a:extLst>
+              </a:tr>
+              <a:tr h="227878">
+                <a:tc>
+                  <a:txBody>
+                    <a:bodyPr/>
+                    <a:lstStyle/>
+                    <a:p>
+                      <a:pPr algn="l" fontAlgn="b"/>
+                      <a:r>
+                        <a:rPr lang="en-MY" sz="1600" b="0" i="0" u="none" strike="noStrike">
+                          <a:solidFill>
+                            <a:srgbClr val="000000"/>
+                          </a:solidFill>
+                          <a:effectLst/>
+                          <a:latin typeface="Arial" panose="020B0604020202020204" pitchFamily="34" charset="0"/>
+                          <a:cs typeface="Arial" panose="020B0604020202020204" pitchFamily="34" charset="0"/>
+                        </a:rPr>
+                        <a:t>AI</a:t>
+                      </a:r>
+                    </a:p>
+                  </a:txBody>
+                  <a:tcPr marL="5620" marR="5620" marT="5620" marB="0" anchor="b">
+                    <a:lnL w="6350" cap="flat" cmpd="sng" algn="ctr">
+                      <a:solidFill>
+                        <a:srgbClr val="000000"/>
+                      </a:solidFill>
+                      <a:prstDash val="solid"/>
+                      <a:round/>
+                      <a:headEnd type="none" w="med" len="med"/>
+                      <a:tailEnd type="none" w="med" len="med"/>
+                    </a:lnL>
+                    <a:lnR w="6350" cap="flat" cmpd="sng" algn="ctr">
+                      <a:solidFill>
+                        <a:srgbClr val="000000"/>
+                      </a:solidFill>
+                      <a:prstDash val="solid"/>
+                      <a:round/>
+                      <a:headEnd type="none" w="med" len="med"/>
+                      <a:tailEnd type="none" w="med" len="med"/>
+                    </a:lnR>
+                    <a:lnT w="6350" cap="flat" cmpd="sng" algn="ctr">
+                      <a:solidFill>
+                        <a:srgbClr val="000000"/>
+                      </a:solidFill>
+                      <a:prstDash val="solid"/>
+                      <a:round/>
+                      <a:headEnd type="none" w="med" len="med"/>
+                      <a:tailEnd type="none" w="med" len="med"/>
+                    </a:lnT>
+                    <a:lnB w="6350" cap="flat" cmpd="sng" algn="ctr">
+                      <a:solidFill>
+                        <a:srgbClr val="000000"/>
+                      </a:solidFill>
+                      <a:prstDash val="solid"/>
+                      <a:round/>
+                      <a:headEnd type="none" w="med" len="med"/>
+                      <a:tailEnd type="none" w="med" len="med"/>
+                    </a:lnB>
+                  </a:tcPr>
+                </a:tc>
+                <a:tc>
+                  <a:txBody>
+                    <a:bodyPr/>
+                    <a:lstStyle/>
+                    <a:p>
+                      <a:pPr algn="l" fontAlgn="b"/>
+                      <a:r>
+                        <a:rPr lang="en-MY" sz="1600" b="0" i="0" u="none" strike="noStrike" dirty="0">
+                          <a:solidFill>
+                            <a:srgbClr val="000000"/>
+                          </a:solidFill>
+                          <a:effectLst/>
+                          <a:latin typeface="Arial" panose="020B0604020202020204" pitchFamily="34" charset="0"/>
+                          <a:cs typeface="Arial" panose="020B0604020202020204" pitchFamily="34" charset="0"/>
+                        </a:rPr>
+                        <a:t>lamO20</a:t>
+                      </a:r>
+                    </a:p>
+                  </a:txBody>
+                  <a:tcPr marL="5620" marR="5620" marT="5620" marB="0" anchor="b">
+                    <a:lnL w="6350" cap="flat" cmpd="sng" algn="ctr">
+                      <a:solidFill>
+                        <a:srgbClr val="000000"/>
+                      </a:solidFill>
+                      <a:prstDash val="solid"/>
+                      <a:round/>
+                      <a:headEnd type="none" w="med" len="med"/>
+                      <a:tailEnd type="none" w="med" len="med"/>
+                    </a:lnL>
+                    <a:lnR w="6350" cap="flat" cmpd="sng" algn="ctr">
+                      <a:solidFill>
+                        <a:srgbClr val="000000"/>
+                      </a:solidFill>
+                      <a:prstDash val="solid"/>
+                      <a:round/>
+                      <a:headEnd type="none" w="med" len="med"/>
+                      <a:tailEnd type="none" w="med" len="med"/>
+                    </a:lnR>
+                    <a:lnT w="6350" cap="flat" cmpd="sng" algn="ctr">
+                      <a:solidFill>
+                        <a:srgbClr val="000000"/>
+                      </a:solidFill>
+                      <a:prstDash val="solid"/>
+                      <a:round/>
+                      <a:headEnd type="none" w="med" len="med"/>
+                      <a:tailEnd type="none" w="med" len="med"/>
+                    </a:lnT>
+                    <a:lnB w="6350" cap="flat" cmpd="sng" algn="ctr">
+                      <a:solidFill>
+                        <a:srgbClr val="000000"/>
+                      </a:solidFill>
+                      <a:prstDash val="solid"/>
+                      <a:round/>
+                      <a:headEnd type="none" w="med" len="med"/>
+                      <a:tailEnd type="none" w="med" len="med"/>
+                    </a:lnB>
+                  </a:tcPr>
+                </a:tc>
+                <a:extLst>
+                  <a:ext uri="{0D108BD9-81ED-4DB2-BD59-A6C34878D82A}">
+                    <a16:rowId xmlns:a16="http://schemas.microsoft.com/office/drawing/2014/main" val="2193971574"/>
+                  </a:ext>
+                </a:extLst>
+              </a:tr>
+              <a:tr h="227878">
+                <a:tc>
+                  <a:txBody>
+                    <a:bodyPr/>
+                    <a:lstStyle/>
+                    <a:p>
+                      <a:pPr algn="l" fontAlgn="b"/>
+                      <a:r>
+                        <a:rPr lang="en-MY" sz="1600" b="0" i="0" u="none" strike="noStrike">
+                          <a:solidFill>
+                            <a:srgbClr val="000000"/>
+                          </a:solidFill>
+                          <a:effectLst/>
+                          <a:latin typeface="Arial" panose="020B0604020202020204" pitchFamily="34" charset="0"/>
+                          <a:cs typeface="Arial" panose="020B0604020202020204" pitchFamily="34" charset="0"/>
+                        </a:rPr>
+                        <a:t>AI_Mod</a:t>
+                      </a:r>
+                    </a:p>
+                  </a:txBody>
+                  <a:tcPr marL="5620" marR="5620" marT="5620" marB="0" anchor="b">
+                    <a:lnL w="6350" cap="flat" cmpd="sng" algn="ctr">
+                      <a:solidFill>
+                        <a:srgbClr val="000000"/>
+                      </a:solidFill>
+                      <a:prstDash val="solid"/>
+                      <a:round/>
+                      <a:headEnd type="none" w="med" len="med"/>
+                      <a:tailEnd type="none" w="med" len="med"/>
+                    </a:lnL>
+                    <a:lnR w="6350" cap="flat" cmpd="sng" algn="ctr">
+                      <a:solidFill>
+                        <a:srgbClr val="000000"/>
+                      </a:solidFill>
+                      <a:prstDash val="solid"/>
+                      <a:round/>
+                      <a:headEnd type="none" w="med" len="med"/>
+                      <a:tailEnd type="none" w="med" len="med"/>
+                    </a:lnR>
+                    <a:lnT w="6350" cap="flat" cmpd="sng" algn="ctr">
+                      <a:solidFill>
+                        <a:srgbClr val="000000"/>
+                      </a:solidFill>
+                      <a:prstDash val="solid"/>
+                      <a:round/>
+                      <a:headEnd type="none" w="med" len="med"/>
+                      <a:tailEnd type="none" w="med" len="med"/>
+                    </a:lnT>
+                    <a:lnB w="6350" cap="flat" cmpd="sng" algn="ctr">
+                      <a:solidFill>
+                        <a:srgbClr val="000000"/>
+                      </a:solidFill>
+                      <a:prstDash val="solid"/>
+                      <a:round/>
+                      <a:headEnd type="none" w="med" len="med"/>
+                      <a:tailEnd type="none" w="med" len="med"/>
+                    </a:lnB>
+                  </a:tcPr>
+                </a:tc>
+                <a:tc>
+                  <a:txBody>
+                    <a:bodyPr/>
+                    <a:lstStyle/>
+                    <a:p>
+                      <a:pPr algn="l" fontAlgn="b"/>
+                      <a:r>
+                        <a:rPr lang="en-MY" sz="1600" b="0" i="0" u="none" strike="noStrike" dirty="0">
+                          <a:solidFill>
+                            <a:srgbClr val="000000"/>
+                          </a:solidFill>
+                          <a:effectLst/>
+                          <a:latin typeface="Arial" panose="020B0604020202020204" pitchFamily="34" charset="0"/>
+                          <a:cs typeface="Arial" panose="020B0604020202020204" pitchFamily="34" charset="0"/>
+                        </a:rPr>
+                        <a:t>lamO2</a:t>
+                      </a:r>
+                    </a:p>
+                  </a:txBody>
+                  <a:tcPr marL="5620" marR="5620" marT="5620" marB="0" anchor="b">
+                    <a:lnL w="6350" cap="flat" cmpd="sng" algn="ctr">
+                      <a:solidFill>
+                        <a:srgbClr val="000000"/>
+                      </a:solidFill>
+                      <a:prstDash val="solid"/>
+                      <a:round/>
+                      <a:headEnd type="none" w="med" len="med"/>
+                      <a:tailEnd type="none" w="med" len="med"/>
+                    </a:lnL>
+                    <a:lnR w="6350" cap="flat" cmpd="sng" algn="ctr">
+                      <a:solidFill>
+                        <a:srgbClr val="000000"/>
+                      </a:solidFill>
+                      <a:prstDash val="solid"/>
+                      <a:round/>
+                      <a:headEnd type="none" w="med" len="med"/>
+                      <a:tailEnd type="none" w="med" len="med"/>
+                    </a:lnR>
+                    <a:lnT w="6350" cap="flat" cmpd="sng" algn="ctr">
+                      <a:solidFill>
+                        <a:srgbClr val="000000"/>
+                      </a:solidFill>
+                      <a:prstDash val="solid"/>
+                      <a:round/>
+                      <a:headEnd type="none" w="med" len="med"/>
+                      <a:tailEnd type="none" w="med" len="med"/>
+                    </a:lnT>
+                    <a:lnB w="6350" cap="flat" cmpd="sng" algn="ctr">
+                      <a:solidFill>
+                        <a:srgbClr val="000000"/>
+                      </a:solidFill>
+                      <a:prstDash val="solid"/>
+                      <a:round/>
+                      <a:headEnd type="none" w="med" len="med"/>
+                      <a:tailEnd type="none" w="med" len="med"/>
+                    </a:lnB>
+                  </a:tcPr>
+                </a:tc>
+                <a:extLst>
+                  <a:ext uri="{0D108BD9-81ED-4DB2-BD59-A6C34878D82A}">
+                    <a16:rowId xmlns:a16="http://schemas.microsoft.com/office/drawing/2014/main" val="4254659943"/>
+                  </a:ext>
+                </a:extLst>
+              </a:tr>
+              <a:tr h="227878">
+                <a:tc>
+                  <a:txBody>
+                    <a:bodyPr/>
+                    <a:lstStyle/>
+                    <a:p>
+                      <a:pPr algn="l" fontAlgn="b"/>
+                      <a:r>
+                        <a:rPr lang="en-MY" sz="1600" b="0" i="0" u="none" strike="noStrike">
+                          <a:solidFill>
+                            <a:srgbClr val="000000"/>
+                          </a:solidFill>
+                          <a:effectLst/>
+                          <a:latin typeface="Arial" panose="020B0604020202020204" pitchFamily="34" charset="0"/>
+                          <a:cs typeface="Arial" panose="020B0604020202020204" pitchFamily="34" charset="0"/>
+                        </a:rPr>
+                        <a:t>DBE</a:t>
+                      </a:r>
+                    </a:p>
+                  </a:txBody>
+                  <a:tcPr marL="5620" marR="5620" marT="5620" marB="0" anchor="b">
+                    <a:lnL w="6350" cap="flat" cmpd="sng" algn="ctr">
+                      <a:solidFill>
+                        <a:srgbClr val="000000"/>
+                      </a:solidFill>
+                      <a:prstDash val="solid"/>
+                      <a:round/>
+                      <a:headEnd type="none" w="med" len="med"/>
+                      <a:tailEnd type="none" w="med" len="med"/>
+                    </a:lnL>
+                    <a:lnR w="6350" cap="flat" cmpd="sng" algn="ctr">
+                      <a:solidFill>
+                        <a:srgbClr val="000000"/>
+                      </a:solidFill>
+                      <a:prstDash val="solid"/>
+                      <a:round/>
+                      <a:headEnd type="none" w="med" len="med"/>
+                      <a:tailEnd type="none" w="med" len="med"/>
+                    </a:lnR>
+                    <a:lnT w="6350" cap="flat" cmpd="sng" algn="ctr">
+                      <a:solidFill>
+                        <a:srgbClr val="000000"/>
+                      </a:solidFill>
+                      <a:prstDash val="solid"/>
+                      <a:round/>
+                      <a:headEnd type="none" w="med" len="med"/>
+                      <a:tailEnd type="none" w="med" len="med"/>
+                    </a:lnT>
+                    <a:lnB w="6350" cap="flat" cmpd="sng" algn="ctr">
+                      <a:solidFill>
+                        <a:srgbClr val="000000"/>
+                      </a:solidFill>
+                      <a:prstDash val="solid"/>
+                      <a:round/>
+                      <a:headEnd type="none" w="med" len="med"/>
+                      <a:tailEnd type="none" w="med" len="med"/>
+                    </a:lnB>
+                  </a:tcPr>
+                </a:tc>
+                <a:tc>
+                  <a:txBody>
+                    <a:bodyPr/>
+                    <a:lstStyle/>
+                    <a:p>
+                      <a:pPr algn="l" fontAlgn="b"/>
+                      <a:r>
+                        <a:rPr lang="en-MY" sz="1600" b="0" i="0" u="none" strike="noStrike" dirty="0">
+                          <a:solidFill>
+                            <a:srgbClr val="000000"/>
+                          </a:solidFill>
+                          <a:effectLst/>
+                          <a:latin typeface="Arial" panose="020B0604020202020204" pitchFamily="34" charset="0"/>
+                          <a:cs typeface="Arial" panose="020B0604020202020204" pitchFamily="34" charset="0"/>
+                        </a:rPr>
+                        <a:t>delGd0</a:t>
+                      </a:r>
+                    </a:p>
+                  </a:txBody>
+                  <a:tcPr marL="5620" marR="5620" marT="5620" marB="0" anchor="b">
+                    <a:lnL w="6350" cap="flat" cmpd="sng" algn="ctr">
+                      <a:solidFill>
+                        <a:srgbClr val="000000"/>
+                      </a:solidFill>
+                      <a:prstDash val="solid"/>
+                      <a:round/>
+                      <a:headEnd type="none" w="med" len="med"/>
+                      <a:tailEnd type="none" w="med" len="med"/>
+                    </a:lnL>
+                    <a:lnR w="6350" cap="flat" cmpd="sng" algn="ctr">
+                      <a:solidFill>
+                        <a:srgbClr val="000000"/>
+                      </a:solidFill>
+                      <a:prstDash val="solid"/>
+                      <a:round/>
+                      <a:headEnd type="none" w="med" len="med"/>
+                      <a:tailEnd type="none" w="med" len="med"/>
+                    </a:lnR>
+                    <a:lnT w="6350" cap="flat" cmpd="sng" algn="ctr">
+                      <a:solidFill>
+                        <a:srgbClr val="000000"/>
+                      </a:solidFill>
+                      <a:prstDash val="solid"/>
+                      <a:round/>
+                      <a:headEnd type="none" w="med" len="med"/>
+                      <a:tailEnd type="none" w="med" len="med"/>
+                    </a:lnT>
+                    <a:lnB w="6350" cap="flat" cmpd="sng" algn="ctr">
+                      <a:solidFill>
+                        <a:srgbClr val="000000"/>
+                      </a:solidFill>
+                      <a:prstDash val="solid"/>
+                      <a:round/>
+                      <a:headEnd type="none" w="med" len="med"/>
+                      <a:tailEnd type="none" w="med" len="med"/>
+                    </a:lnB>
+                  </a:tcPr>
+                </a:tc>
+                <a:extLst>
+                  <a:ext uri="{0D108BD9-81ED-4DB2-BD59-A6C34878D82A}">
+                    <a16:rowId xmlns:a16="http://schemas.microsoft.com/office/drawing/2014/main" val="939478301"/>
+                  </a:ext>
+                </a:extLst>
+              </a:tr>
+              <a:tr h="227878">
+                <a:tc>
+                  <a:txBody>
+                    <a:bodyPr/>
+                    <a:lstStyle/>
+                    <a:p>
+                      <a:pPr algn="l" fontAlgn="b"/>
+                      <a:r>
+                        <a:rPr lang="en-MY" sz="1600" b="0" i="0" u="none" strike="noStrike">
+                          <a:solidFill>
+                            <a:srgbClr val="000000"/>
+                          </a:solidFill>
+                          <a:effectLst/>
+                          <a:latin typeface="Arial" panose="020B0604020202020204" pitchFamily="34" charset="0"/>
+                          <a:cs typeface="Arial" panose="020B0604020202020204" pitchFamily="34" charset="0"/>
+                        </a:rPr>
+                        <a:t>DBE_O</a:t>
+                      </a:r>
+                    </a:p>
+                  </a:txBody>
+                  <a:tcPr marL="5620" marR="5620" marT="5620" marB="0" anchor="b">
+                    <a:lnL w="6350" cap="flat" cmpd="sng" algn="ctr">
+                      <a:solidFill>
+                        <a:srgbClr val="000000"/>
+                      </a:solidFill>
+                      <a:prstDash val="solid"/>
+                      <a:round/>
+                      <a:headEnd type="none" w="med" len="med"/>
+                      <a:tailEnd type="none" w="med" len="med"/>
+                    </a:lnL>
+                    <a:lnR w="6350" cap="flat" cmpd="sng" algn="ctr">
+                      <a:solidFill>
+                        <a:srgbClr val="000000"/>
+                      </a:solidFill>
+                      <a:prstDash val="solid"/>
+                      <a:round/>
+                      <a:headEnd type="none" w="med" len="med"/>
+                      <a:tailEnd type="none" w="med" len="med"/>
+                    </a:lnR>
+                    <a:lnT w="6350" cap="flat" cmpd="sng" algn="ctr">
+                      <a:solidFill>
+                        <a:srgbClr val="000000"/>
+                      </a:solidFill>
+                      <a:prstDash val="solid"/>
+                      <a:round/>
+                      <a:headEnd type="none" w="med" len="med"/>
+                      <a:tailEnd type="none" w="med" len="med"/>
+                    </a:lnT>
+                    <a:lnB w="6350" cap="flat" cmpd="sng" algn="ctr">
+                      <a:solidFill>
+                        <a:srgbClr val="000000"/>
+                      </a:solidFill>
+                      <a:prstDash val="solid"/>
+                      <a:round/>
+                      <a:headEnd type="none" w="med" len="med"/>
+                      <a:tailEnd type="none" w="med" len="med"/>
+                    </a:lnB>
+                  </a:tcPr>
+                </a:tc>
+                <a:tc>
+                  <a:txBody>
+                    <a:bodyPr/>
+                    <a:lstStyle/>
+                    <a:p>
+                      <a:pPr algn="l" fontAlgn="b"/>
+                      <a:r>
+                        <a:rPr lang="en-MY" sz="1600" b="0" i="0" u="none" strike="noStrike" dirty="0" err="1">
+                          <a:solidFill>
+                            <a:srgbClr val="000000"/>
+                          </a:solidFill>
+                          <a:effectLst/>
+                          <a:latin typeface="Arial" panose="020B0604020202020204" pitchFamily="34" charset="0"/>
+                          <a:cs typeface="Arial" panose="020B0604020202020204" pitchFamily="34" charset="0"/>
+                        </a:rPr>
+                        <a:t>delGd</a:t>
+                      </a:r>
+                      <a:endParaRPr lang="en-MY" sz="1600" b="0" i="0" u="none" strike="noStrike" dirty="0">
+                        <a:solidFill>
+                          <a:srgbClr val="000000"/>
+                        </a:solidFill>
+                        <a:effectLst/>
+                        <a:latin typeface="Arial" panose="020B0604020202020204" pitchFamily="34" charset="0"/>
+                        <a:cs typeface="Arial" panose="020B0604020202020204" pitchFamily="34" charset="0"/>
+                      </a:endParaRPr>
+                    </a:p>
+                  </a:txBody>
+                  <a:tcPr marL="5620" marR="5620" marT="5620" marB="0" anchor="b">
+                    <a:lnL w="6350" cap="flat" cmpd="sng" algn="ctr">
+                      <a:solidFill>
+                        <a:srgbClr val="000000"/>
+                      </a:solidFill>
+                      <a:prstDash val="solid"/>
+                      <a:round/>
+                      <a:headEnd type="none" w="med" len="med"/>
+                      <a:tailEnd type="none" w="med" len="med"/>
+                    </a:lnL>
+                    <a:lnR w="6350" cap="flat" cmpd="sng" algn="ctr">
+                      <a:solidFill>
+                        <a:srgbClr val="000000"/>
+                      </a:solidFill>
+                      <a:prstDash val="solid"/>
+                      <a:round/>
+                      <a:headEnd type="none" w="med" len="med"/>
+                      <a:tailEnd type="none" w="med" len="med"/>
+                    </a:lnR>
+                    <a:lnT w="6350" cap="flat" cmpd="sng" algn="ctr">
+                      <a:solidFill>
+                        <a:srgbClr val="000000"/>
+                      </a:solidFill>
+                      <a:prstDash val="solid"/>
+                      <a:round/>
+                      <a:headEnd type="none" w="med" len="med"/>
+                      <a:tailEnd type="none" w="med" len="med"/>
+                    </a:lnT>
+                    <a:lnB w="6350" cap="flat" cmpd="sng" algn="ctr">
+                      <a:solidFill>
+                        <a:srgbClr val="000000"/>
+                      </a:solidFill>
+                      <a:prstDash val="solid"/>
+                      <a:round/>
+                      <a:headEnd type="none" w="med" len="med"/>
+                      <a:tailEnd type="none" w="med" len="med"/>
+                    </a:lnB>
+                  </a:tcPr>
+                </a:tc>
+                <a:extLst>
+                  <a:ext uri="{0D108BD9-81ED-4DB2-BD59-A6C34878D82A}">
+                    <a16:rowId xmlns:a16="http://schemas.microsoft.com/office/drawing/2014/main" val="3183061977"/>
+                  </a:ext>
+                </a:extLst>
+              </a:tr>
+              <a:tr h="227878">
+                <a:tc>
+                  <a:txBody>
+                    <a:bodyPr/>
+                    <a:lstStyle/>
+                    <a:p>
+                      <a:pPr algn="l" fontAlgn="b"/>
+                      <a:r>
+                        <a:rPr lang="en-MY" sz="1600" b="0" i="0" u="none" strike="noStrike">
+                          <a:solidFill>
+                            <a:srgbClr val="000000"/>
+                          </a:solidFill>
+                          <a:effectLst/>
+                          <a:latin typeface="Arial" panose="020B0604020202020204" pitchFamily="34" charset="0"/>
+                          <a:cs typeface="Arial" panose="020B0604020202020204" pitchFamily="34" charset="0"/>
+                        </a:rPr>
+                        <a:t>DBE_AI</a:t>
+                      </a:r>
+                    </a:p>
+                  </a:txBody>
+                  <a:tcPr marL="5620" marR="5620" marT="5620" marB="0" anchor="b">
+                    <a:lnL w="6350" cap="flat" cmpd="sng" algn="ctr">
+                      <a:solidFill>
+                        <a:srgbClr val="000000"/>
+                      </a:solidFill>
+                      <a:prstDash val="solid"/>
+                      <a:round/>
+                      <a:headEnd type="none" w="med" len="med"/>
+                      <a:tailEnd type="none" w="med" len="med"/>
+                    </a:lnL>
+                    <a:lnR w="6350" cap="flat" cmpd="sng" algn="ctr">
+                      <a:solidFill>
+                        <a:srgbClr val="000000"/>
+                      </a:solidFill>
+                      <a:prstDash val="solid"/>
+                      <a:round/>
+                      <a:headEnd type="none" w="med" len="med"/>
+                      <a:tailEnd type="none" w="med" len="med"/>
+                    </a:lnR>
+                    <a:lnT w="6350" cap="flat" cmpd="sng" algn="ctr">
+                      <a:solidFill>
+                        <a:srgbClr val="000000"/>
+                      </a:solidFill>
+                      <a:prstDash val="solid"/>
+                      <a:round/>
+                      <a:headEnd type="none" w="med" len="med"/>
+                      <a:tailEnd type="none" w="med" len="med"/>
+                    </a:lnT>
+                    <a:lnB w="6350" cap="flat" cmpd="sng" algn="ctr">
+                      <a:solidFill>
+                        <a:srgbClr val="000000"/>
+                      </a:solidFill>
+                      <a:prstDash val="solid"/>
+                      <a:round/>
+                      <a:headEnd type="none" w="med" len="med"/>
+                      <a:tailEnd type="none" w="med" len="med"/>
+                    </a:lnB>
+                  </a:tcPr>
+                </a:tc>
+                <a:tc>
+                  <a:txBody>
+                    <a:bodyPr/>
+                    <a:lstStyle/>
+                    <a:p>
+                      <a:pPr algn="l" fontAlgn="b"/>
+                      <a:r>
+                        <a:rPr lang="en-MY" sz="1600" b="0" i="0" u="none" strike="noStrike" dirty="0" err="1">
+                          <a:solidFill>
+                            <a:srgbClr val="000000"/>
+                          </a:solidFill>
+                          <a:effectLst/>
+                          <a:latin typeface="Arial" panose="020B0604020202020204" pitchFamily="34" charset="0"/>
+                          <a:cs typeface="Arial" panose="020B0604020202020204" pitchFamily="34" charset="0"/>
+                        </a:rPr>
+                        <a:t>n.mf</a:t>
+                      </a:r>
+                      <a:endParaRPr lang="en-MY" sz="1600" b="0" i="0" u="none" strike="noStrike" dirty="0">
+                        <a:solidFill>
+                          <a:srgbClr val="000000"/>
+                        </a:solidFill>
+                        <a:effectLst/>
+                        <a:latin typeface="Arial" panose="020B0604020202020204" pitchFamily="34" charset="0"/>
+                        <a:cs typeface="Arial" panose="020B0604020202020204" pitchFamily="34" charset="0"/>
+                      </a:endParaRPr>
+                    </a:p>
+                  </a:txBody>
+                  <a:tcPr marL="5620" marR="5620" marT="5620" marB="0" anchor="b">
+                    <a:lnL w="6350" cap="flat" cmpd="sng" algn="ctr">
+                      <a:solidFill>
+                        <a:srgbClr val="000000"/>
+                      </a:solidFill>
+                      <a:prstDash val="solid"/>
+                      <a:round/>
+                      <a:headEnd type="none" w="med" len="med"/>
+                      <a:tailEnd type="none" w="med" len="med"/>
+                    </a:lnL>
+                    <a:lnR w="6350" cap="flat" cmpd="sng" algn="ctr">
+                      <a:solidFill>
+                        <a:srgbClr val="000000"/>
+                      </a:solidFill>
+                      <a:prstDash val="solid"/>
+                      <a:round/>
+                      <a:headEnd type="none" w="med" len="med"/>
+                      <a:tailEnd type="none" w="med" len="med"/>
+                    </a:lnR>
+                    <a:lnT w="6350" cap="flat" cmpd="sng" algn="ctr">
+                      <a:solidFill>
+                        <a:srgbClr val="000000"/>
+                      </a:solidFill>
+                      <a:prstDash val="solid"/>
+                      <a:round/>
+                      <a:headEnd type="none" w="med" len="med"/>
+                      <a:tailEnd type="none" w="med" len="med"/>
+                    </a:lnT>
+                    <a:lnB w="6350" cap="flat" cmpd="sng" algn="ctr">
+                      <a:solidFill>
+                        <a:srgbClr val="000000"/>
+                      </a:solidFill>
+                      <a:prstDash val="solid"/>
+                      <a:round/>
+                      <a:headEnd type="none" w="med" len="med"/>
+                      <a:tailEnd type="none" w="med" len="med"/>
+                    </a:lnB>
+                  </a:tcPr>
+                </a:tc>
+                <a:extLst>
+                  <a:ext uri="{0D108BD9-81ED-4DB2-BD59-A6C34878D82A}">
+                    <a16:rowId xmlns:a16="http://schemas.microsoft.com/office/drawing/2014/main" val="1978760179"/>
+                  </a:ext>
+                </a:extLst>
+              </a:tr>
+            </a:tbl>
+          </a:graphicData>
+        </a:graphic>
+      </p:graphicFrame>
+      <p:sp>
+        <p:nvSpPr>
+          <p:cNvPr id="8" name="Rectangle 7">
+            <a:extLst>
+              <a:ext uri="{FF2B5EF4-FFF2-40B4-BE49-F238E27FC236}">
+                <a16:creationId xmlns:a16="http://schemas.microsoft.com/office/drawing/2014/main" id="{735F63E0-45C1-403B-8067-AE954673394C}"/>
+              </a:ext>
+            </a:extLst>
+          </p:cNvPr>
+          <p:cNvSpPr/>
+          <p:nvPr/>
+        </p:nvSpPr>
+        <p:spPr>
+          <a:xfrm>
+            <a:off x="7612923" y="1766263"/>
+            <a:ext cx="1801199" cy="369332"/>
+          </a:xfrm>
+          <a:prstGeom prst="rect">
+            <a:avLst/>
+          </a:prstGeom>
+        </p:spPr>
+        <p:txBody>
+          <a:bodyPr wrap="none">
+            <a:spAutoFit/>
+          </a:bodyPr>
+          <a:lstStyle/>
+          <a:p>
+            <a:r>
+              <a:rPr lang="en-US" b="1" dirty="0">
+                <a:solidFill>
+                  <a:srgbClr val="FF0000"/>
+                </a:solidFill>
+              </a:rPr>
+              <a:t>OM assemblages</a:t>
+            </a:r>
+            <a:endParaRPr lang="en-MY" dirty="0"/>
+          </a:p>
+        </p:txBody>
+      </p:sp>
+      <p:sp>
+        <p:nvSpPr>
+          <p:cNvPr id="10" name="Rectangle 9">
+            <a:extLst>
+              <a:ext uri="{FF2B5EF4-FFF2-40B4-BE49-F238E27FC236}">
+                <a16:creationId xmlns:a16="http://schemas.microsoft.com/office/drawing/2014/main" id="{A3D6B130-785A-43EF-84C9-090241950656}"/>
+              </a:ext>
+            </a:extLst>
+          </p:cNvPr>
+          <p:cNvSpPr/>
+          <p:nvPr/>
+        </p:nvSpPr>
+        <p:spPr>
+          <a:xfrm>
+            <a:off x="5603309" y="2462015"/>
+            <a:ext cx="6096000" cy="2554545"/>
+          </a:xfrm>
+          <a:prstGeom prst="rect">
+            <a:avLst/>
+          </a:prstGeom>
+        </p:spPr>
+        <p:txBody>
+          <a:bodyPr>
+            <a:spAutoFit/>
+          </a:bodyPr>
+          <a:lstStyle/>
+          <a:p>
+            <a:r>
+              <a:rPr lang="en-MY" sz="1600" dirty="0">
+                <a:hlinkClick r:id="rId2"/>
+              </a:rPr>
+              <a:t>https://www.frontiersin.org/articles/10.3389/frwa.2022.870453/full</a:t>
+            </a:r>
+            <a:endParaRPr lang="en-MY" sz="1600" dirty="0"/>
+          </a:p>
+          <a:p>
+            <a:endParaRPr lang="en-MY" sz="1600" dirty="0"/>
+          </a:p>
+          <a:p>
+            <a:r>
+              <a:rPr lang="en-MY" sz="1600" dirty="0"/>
+              <a:t>That is, </a:t>
+            </a:r>
+            <a:r>
+              <a:rPr lang="en-MY" sz="1600" b="1" dirty="0"/>
+              <a:t>OM is a collection of molecules that are assembled through molecular production (analogous to birth), transformation (analogous to death), and transport (analogous to dispersal). </a:t>
+            </a:r>
+            <a:r>
+              <a:rPr lang="en-MY" sz="1600" dirty="0"/>
+              <a:t>Therefore, the “community structure” of OM composition can likely be used to study the underlying </a:t>
+            </a:r>
+            <a:r>
+              <a:rPr lang="en-MY" sz="1600" dirty="0" err="1"/>
+              <a:t>hydrobiogeochemical</a:t>
+            </a:r>
+            <a:r>
+              <a:rPr lang="en-MY" sz="1600" dirty="0"/>
+              <a:t> processes regulating the OM assemblage. These conceptual parallels and congruent data structures provide a strong motivation to study OM chemistry by asking questions comparable to those pursued in community ecology.</a:t>
+            </a:r>
+          </a:p>
+        </p:txBody>
+      </p:sp>
+    </p:spTree>
+    <p:extLst>
+      <p:ext uri="{BB962C8B-B14F-4D97-AF65-F5344CB8AC3E}">
+        <p14:creationId xmlns:p14="http://schemas.microsoft.com/office/powerpoint/2010/main" val="158795167"/>
+      </p:ext>
+    </p:extLst>
+  </p:cSld>
+  <p:clrMapOvr>
+    <a:masterClrMapping/>
+  </p:clrMapOvr>
+</p:sld>
+</file>
+
+<file path=ppt/slides/slide7.xml><?xml version="1.0" encoding="utf-8"?>
+<p:sld xmlns:a="http://schemas.openxmlformats.org/drawingml/2006/main" xmlns:r="http://schemas.openxmlformats.org/officeDocument/2006/relationships" xmlns:p="http://schemas.openxmlformats.org/presentationml/2006/main">
+  <p:cSld>
+    <p:spTree>
+      <p:nvGrpSpPr>
+        <p:cNvPr id="1" name=""/>
+        <p:cNvGrpSpPr/>
+        <p:nvPr/>
+      </p:nvGrpSpPr>
+      <p:grpSpPr>
+        <a:xfrm>
+          <a:off x="0" y="0"/>
+          <a:ext cx="0" cy="0"/>
+          <a:chOff x="0" y="0"/>
+          <a:chExt cx="0" cy="0"/>
+        </a:xfrm>
+      </p:grpSpPr>
+      <p:sp>
+        <p:nvSpPr>
+          <p:cNvPr id="2" name="Title 1">
+            <a:extLst>
+              <a:ext uri="{FF2B5EF4-FFF2-40B4-BE49-F238E27FC236}">
+                <a16:creationId xmlns:a16="http://schemas.microsoft.com/office/drawing/2014/main" id="{C01EA05A-92F0-4488-8A7B-35D127981370}"/>
+              </a:ext>
+            </a:extLst>
+          </p:cNvPr>
+          <p:cNvSpPr>
+            <a:spLocks noGrp="1"/>
+          </p:cNvSpPr>
+          <p:nvPr>
+            <p:ph type="title"/>
+          </p:nvPr>
+        </p:nvSpPr>
+        <p:spPr/>
+        <p:txBody>
+          <a:bodyPr/>
+          <a:lstStyle/>
+          <a:p>
+            <a:r>
+              <a:rPr lang="en-US" dirty="0"/>
+              <a:t>Reference</a:t>
+            </a:r>
+            <a:endParaRPr lang="en-MY" dirty="0"/>
+          </a:p>
+        </p:txBody>
+      </p:sp>
+      <p:sp>
+        <p:nvSpPr>
+          <p:cNvPr id="3" name="Rectangle 2">
+            <a:extLst>
+              <a:ext uri="{FF2B5EF4-FFF2-40B4-BE49-F238E27FC236}">
+                <a16:creationId xmlns:a16="http://schemas.microsoft.com/office/drawing/2014/main" id="{E37C13C4-222D-4C20-A8BC-59E4AA7403B6}"/>
+              </a:ext>
+            </a:extLst>
+          </p:cNvPr>
+          <p:cNvSpPr/>
+          <p:nvPr/>
+        </p:nvSpPr>
+        <p:spPr>
+          <a:xfrm>
+            <a:off x="838200" y="6075253"/>
+            <a:ext cx="3632533" cy="646331"/>
+          </a:xfrm>
+          <a:prstGeom prst="rect">
+            <a:avLst/>
+          </a:prstGeom>
+        </p:spPr>
+        <p:txBody>
+          <a:bodyPr wrap="none">
+            <a:spAutoFit/>
+          </a:bodyPr>
+          <a:lstStyle/>
+          <a:p>
+            <a:r>
+              <a:rPr lang="en-MY" dirty="0">
+                <a:hlinkClick r:id="rId2"/>
+              </a:rPr>
+              <a:t>https://xmlin.shinyapps.io/whondrs/</a:t>
+            </a:r>
+            <a:endParaRPr lang="en-MY" dirty="0"/>
+          </a:p>
+          <a:p>
+            <a:endParaRPr lang="en-MY" dirty="0"/>
+          </a:p>
+        </p:txBody>
+      </p:sp>
+      <p:sp>
+        <p:nvSpPr>
+          <p:cNvPr id="4" name="Rectangle 3">
+            <a:extLst>
+              <a:ext uri="{FF2B5EF4-FFF2-40B4-BE49-F238E27FC236}">
+                <a16:creationId xmlns:a16="http://schemas.microsoft.com/office/drawing/2014/main" id="{385C52CE-F170-4265-A9D8-B546161089A0}"/>
+              </a:ext>
+            </a:extLst>
+          </p:cNvPr>
+          <p:cNvSpPr/>
+          <p:nvPr/>
+        </p:nvSpPr>
+        <p:spPr>
+          <a:xfrm>
+            <a:off x="6280759" y="1848504"/>
+            <a:ext cx="5543811" cy="4278094"/>
+          </a:xfrm>
+          <a:prstGeom prst="rect">
+            <a:avLst/>
+          </a:prstGeom>
+        </p:spPr>
+        <p:txBody>
+          <a:bodyPr wrap="square">
+            <a:spAutoFit/>
+          </a:bodyPr>
+          <a:lstStyle/>
+          <a:p>
+            <a:r>
+              <a:rPr lang="en-MY" sz="1600" dirty="0"/>
+              <a:t>The WHONDRS-GUI is an important element of understanding connections among hydrologic, biogeochemical, and microbial function within river corridors. The GUI alone will not provide this understanding, however, and must be coupled with additional analyses and tools as well as additional data types that are not currently in the datasets. For example, detailed molecular properties of dissolved organic matter (DOM) are provided by the FTICR data, which can be paired with data on environmental characteristics (e.g., vegetation type, land use, ecosystem productivity, etc.) that are publicly available. Because all WHONDRS data are georeferenced, these additional environmental data can be extracted from other sources and paired with WHONDRS data to evaluate aspects of the environment that explain variation in DOM chemistry at the global scale. Outcomes of such analyses would provide novel hypotheses to be evaluated through additional sampling, experimentation, and/or </a:t>
+            </a:r>
+            <a:r>
+              <a:rPr lang="en-MY" sz="1600" dirty="0" err="1"/>
+              <a:t>modeling</a:t>
+            </a:r>
+            <a:r>
+              <a:rPr lang="en-MY" sz="1600" dirty="0"/>
+              <a:t>.</a:t>
+            </a:r>
+          </a:p>
+        </p:txBody>
+      </p:sp>
+      <p:pic>
+        <p:nvPicPr>
+          <p:cNvPr id="5" name="Picture 4">
+            <a:extLst>
+              <a:ext uri="{FF2B5EF4-FFF2-40B4-BE49-F238E27FC236}">
+                <a16:creationId xmlns:a16="http://schemas.microsoft.com/office/drawing/2014/main" id="{1EC99BB5-3BE9-42C1-9FD2-A106493C749E}"/>
+              </a:ext>
+            </a:extLst>
+          </p:cNvPr>
+          <p:cNvPicPr>
+            <a:picLocks noChangeAspect="1"/>
+          </p:cNvPicPr>
+          <p:nvPr/>
+        </p:nvPicPr>
+        <p:blipFill>
+          <a:blip r:embed="rId3"/>
+          <a:stretch>
+            <a:fillRect/>
+          </a:stretch>
+        </p:blipFill>
+        <p:spPr>
+          <a:xfrm>
+            <a:off x="900832" y="1521910"/>
+            <a:ext cx="5249448" cy="3174662"/>
+          </a:xfrm>
+          <a:prstGeom prst="rect">
+            <a:avLst/>
+          </a:prstGeom>
+        </p:spPr>
+      </p:pic>
+    </p:spTree>
+    <p:extLst>
+      <p:ext uri="{BB962C8B-B14F-4D97-AF65-F5344CB8AC3E}">
+        <p14:creationId xmlns:p14="http://schemas.microsoft.com/office/powerpoint/2010/main" val="3168666200"/>
+      </p:ext>
+    </p:extLst>
+  </p:cSld>
+  <p:clrMapOvr>
+    <a:masterClrMapping/>
+  </p:clrMapOvr>
+</p:sld>
+</file>
+
+<file path=ppt/slides/slide8.xml><?xml version="1.0" encoding="utf-8"?>
+<p:sld xmlns:a="http://schemas.openxmlformats.org/drawingml/2006/main" xmlns:r="http://schemas.openxmlformats.org/officeDocument/2006/relationships" xmlns:p="http://schemas.openxmlformats.org/presentationml/2006/main">
+  <p:cSld>
+    <p:spTree>
+      <p:nvGrpSpPr>
+        <p:cNvPr id="1" name=""/>
+        <p:cNvGrpSpPr/>
+        <p:nvPr/>
+      </p:nvGrpSpPr>
+      <p:grpSpPr>
+        <a:xfrm>
+          <a:off x="0" y="0"/>
+          <a:ext cx="0" cy="0"/>
+          <a:chOff x="0" y="0"/>
+          <a:chExt cx="0" cy="0"/>
+        </a:xfrm>
+      </p:grpSpPr>
+      <p:sp>
+        <p:nvSpPr>
+          <p:cNvPr id="2" name="Title 1">
+            <a:extLst>
+              <a:ext uri="{FF2B5EF4-FFF2-40B4-BE49-F238E27FC236}">
+                <a16:creationId xmlns:a16="http://schemas.microsoft.com/office/drawing/2014/main" id="{3AA2E629-C040-4E15-AFB4-37EDDA9F53C0}"/>
+              </a:ext>
+            </a:extLst>
+          </p:cNvPr>
+          <p:cNvSpPr>
+            <a:spLocks noGrp="1"/>
+          </p:cNvSpPr>
+          <p:nvPr>
+            <p:ph type="title"/>
+          </p:nvPr>
+        </p:nvSpPr>
+        <p:spPr/>
+        <p:txBody>
+          <a:bodyPr/>
+          <a:lstStyle/>
+          <a:p>
+            <a:r>
+              <a:rPr lang="en-US" dirty="0"/>
+              <a:t>Next steps</a:t>
+            </a:r>
+            <a:endParaRPr lang="en-MY" dirty="0"/>
+          </a:p>
+        </p:txBody>
+      </p:sp>
+      <p:sp>
+        <p:nvSpPr>
+          <p:cNvPr id="3" name="Content Placeholder 2">
+            <a:extLst>
+              <a:ext uri="{FF2B5EF4-FFF2-40B4-BE49-F238E27FC236}">
+                <a16:creationId xmlns:a16="http://schemas.microsoft.com/office/drawing/2014/main" id="{FD54AC69-90CF-4B2C-AEA8-6230BBAB93E5}"/>
+              </a:ext>
+            </a:extLst>
+          </p:cNvPr>
+          <p:cNvSpPr>
+            <a:spLocks noGrp="1"/>
+          </p:cNvSpPr>
+          <p:nvPr>
+            <p:ph idx="1"/>
+          </p:nvPr>
+        </p:nvSpPr>
+        <p:spPr/>
+        <p:txBody>
+          <a:bodyPr/>
+          <a:lstStyle/>
+          <a:p>
+            <a:r>
+              <a:rPr lang="en-US" dirty="0"/>
+              <a:t>Apply unsupervised to both water and sediment to get clusters</a:t>
+            </a:r>
+          </a:p>
+          <a:p>
+            <a:pPr lvl="1"/>
+            <a:r>
+              <a:rPr lang="en-US" dirty="0"/>
+              <a:t>Water clustering – cluster 1,2,3</a:t>
+            </a:r>
+          </a:p>
+          <a:p>
+            <a:pPr lvl="1"/>
+            <a:r>
+              <a:rPr lang="en-US" dirty="0"/>
+              <a:t>Sediment clustering -  cluster 4,5,6</a:t>
+            </a:r>
+          </a:p>
+          <a:p>
+            <a:pPr lvl="1"/>
+            <a:r>
+              <a:rPr lang="en-US" dirty="0"/>
+              <a:t>Miko to send over file with “site ID” and cluster label</a:t>
+            </a:r>
+          </a:p>
+          <a:p>
+            <a:pPr lvl="1"/>
+            <a:endParaRPr lang="en-US" dirty="0"/>
+          </a:p>
+          <a:p>
+            <a:r>
+              <a:rPr lang="en-US" b="1" dirty="0"/>
+              <a:t>Clusters label (1,2,3,4,5,6) as “target” to Florina’s model (with combined dataset as the main input data) </a:t>
+            </a:r>
+          </a:p>
+          <a:p>
+            <a:endParaRPr lang="en-US" dirty="0"/>
+          </a:p>
+          <a:p>
+            <a:r>
+              <a:rPr lang="en-US" dirty="0"/>
+              <a:t>New unseen data as testing for Flo’s model </a:t>
+            </a:r>
+            <a:endParaRPr lang="en-MY" dirty="0"/>
+          </a:p>
+        </p:txBody>
+      </p:sp>
+    </p:spTree>
+    <p:extLst>
+      <p:ext uri="{BB962C8B-B14F-4D97-AF65-F5344CB8AC3E}">
+        <p14:creationId xmlns:p14="http://schemas.microsoft.com/office/powerpoint/2010/main" val="204821132"/>
       </p:ext>
     </p:extLst>
   </p:cSld>

</xml_diff>